<commit_message>
pptx Calculadora y LightSaber
</commit_message>
<xml_diff>
--- a/Never Bored.pptx
+++ b/Never Bored.pptx
@@ -25,7 +25,7 @@
   <p:notesSz cx="6858000" cy="9144000"/>
   <p:defaultTextStyle>
     <a:defPPr rtl="0">
-      <a:defRPr lang="es-es"/>
+      <a:defRPr lang="es-ES"/>
     </a:defPPr>
     <a:lvl1pPr marL="0" algn="l" defTabSz="914400" rtl="0" eaLnBrk="1" latinLnBrk="0" hangingPunct="1">
       <a:defRPr sz="1800" kern="1200">
@@ -281,7 +281,7 @@
             <a:pPr rtl="0"/>
             <a:fld id="{84A4F617-7A30-41D4-AB86-5D833C98E18B}" type="slidenum">
               <a:rPr lang="es-ES" smtClean="0"/>
-              <a:t>‹Nº›</a:t>
+              <a:t>‹#›</a:t>
             </a:fld>
             <a:endParaRPr lang="es-ES" dirty="0"/>
           </a:p>
@@ -544,7 +544,7 @@
             <a:pPr rtl="0"/>
             <a:fld id="{1B9A179D-2D27-49E2-B022-8EDDA2EFE682}" type="slidenum">
               <a:rPr lang="es-ES" noProof="0" smtClean="0"/>
-              <a:t>‹Nº›</a:t>
+              <a:t>‹#›</a:t>
             </a:fld>
             <a:endParaRPr lang="es-ES" noProof="0" dirty="0"/>
           </a:p>
@@ -2056,7 +2056,7 @@
             <a:pPr rtl="0"/>
             <a:fld id="{A7F8E3F6-DE14-48B2-B2BC-6FABA9630FB8}" type="slidenum">
               <a:rPr lang="es-ES" noProof="0" smtClean="0"/>
-              <a:t>‹Nº›</a:t>
+              <a:t>‹#›</a:t>
             </a:fld>
             <a:endParaRPr lang="es-ES" noProof="0" dirty="0"/>
           </a:p>
@@ -2670,7 +2670,7 @@
             <a:pPr rtl="0"/>
             <a:fld id="{A7F8E3F6-DE14-48B2-B2BC-6FABA9630FB8}" type="slidenum">
               <a:rPr lang="es-ES" noProof="0" smtClean="0"/>
-              <a:t>‹Nº›</a:t>
+              <a:t>‹#›</a:t>
             </a:fld>
             <a:endParaRPr lang="es-ES" noProof="0" dirty="0"/>
           </a:p>
@@ -2862,7 +2862,7 @@
             <a:pPr rtl="0"/>
             <a:fld id="{A7F8E3F6-DE14-48B2-B2BC-6FABA9630FB8}" type="slidenum">
               <a:rPr lang="es-ES" noProof="0" smtClean="0"/>
-              <a:t>‹Nº›</a:t>
+              <a:t>‹#›</a:t>
             </a:fld>
             <a:endParaRPr lang="es-ES" noProof="0" dirty="0"/>
           </a:p>
@@ -3213,7 +3213,7 @@
             <a:fld id="{A7F8E3F6-DE14-48B2-B2BC-6FABA9630FB8}" type="slidenum">
               <a:rPr lang="es-ES" noProof="0" smtClean="0"/>
               <a:pPr rtl="0"/>
-              <a:t>‹Nº›</a:t>
+              <a:t>‹#›</a:t>
             </a:fld>
             <a:endParaRPr lang="es-ES" noProof="0" dirty="0"/>
           </a:p>
@@ -3405,7 +3405,7 @@
             <a:pPr rtl="0"/>
             <a:fld id="{A7F8E3F6-DE14-48B2-B2BC-6FABA9630FB8}" type="slidenum">
               <a:rPr lang="es-ES" noProof="0" smtClean="0"/>
-              <a:t>‹Nº›</a:t>
+              <a:t>‹#›</a:t>
             </a:fld>
             <a:endParaRPr lang="es-ES" noProof="0" dirty="0"/>
           </a:p>
@@ -4591,7 +4591,7 @@
             <a:pPr rtl="0"/>
             <a:fld id="{A7F8E3F6-DE14-48B2-B2BC-6FABA9630FB8}" type="slidenum">
               <a:rPr lang="es-ES" noProof="0" smtClean="0"/>
-              <a:t>‹Nº›</a:t>
+              <a:t>‹#›</a:t>
             </a:fld>
             <a:endParaRPr lang="es-ES" noProof="0" dirty="0"/>
           </a:p>
@@ -4987,7 +4987,7 @@
             <a:pPr rtl="0"/>
             <a:fld id="{A7F8E3F6-DE14-48B2-B2BC-6FABA9630FB8}" type="slidenum">
               <a:rPr lang="es-ES" noProof="0" smtClean="0"/>
-              <a:t>‹Nº›</a:t>
+              <a:t>‹#›</a:t>
             </a:fld>
             <a:endParaRPr lang="es-ES" noProof="0" dirty="0"/>
           </a:p>
@@ -5124,7 +5124,7 @@
             <a:pPr rtl="0"/>
             <a:fld id="{A7F8E3F6-DE14-48B2-B2BC-6FABA9630FB8}" type="slidenum">
               <a:rPr lang="es-ES" noProof="0" smtClean="0"/>
-              <a:t>‹Nº›</a:t>
+              <a:t>‹#›</a:t>
             </a:fld>
             <a:endParaRPr lang="es-ES" noProof="0" dirty="0"/>
           </a:p>
@@ -5237,7 +5237,7 @@
             <a:pPr rtl="0"/>
             <a:fld id="{A7F8E3F6-DE14-48B2-B2BC-6FABA9630FB8}" type="slidenum">
               <a:rPr lang="es-ES" noProof="0" smtClean="0"/>
-              <a:t>‹Nº›</a:t>
+              <a:t>‹#›</a:t>
             </a:fld>
             <a:endParaRPr lang="es-ES" noProof="0" dirty="0"/>
           </a:p>
@@ -5534,7 +5534,7 @@
             <a:pPr rtl="0"/>
             <a:fld id="{A7F8E3F6-DE14-48B2-B2BC-6FABA9630FB8}" type="slidenum">
               <a:rPr lang="es-ES" noProof="0" smtClean="0"/>
-              <a:t>‹Nº›</a:t>
+              <a:t>‹#›</a:t>
             </a:fld>
             <a:endParaRPr lang="es-ES" noProof="0" dirty="0"/>
           </a:p>
@@ -5938,7 +5938,7 @@
             <a:fld id="{A7F8E3F6-DE14-48B2-B2BC-6FABA9630FB8}" type="slidenum">
               <a:rPr lang="es-ES" noProof="0" smtClean="0"/>
               <a:pPr rtl="0"/>
-              <a:t>‹Nº›</a:t>
+              <a:t>‹#›</a:t>
             </a:fld>
             <a:endParaRPr lang="es-ES" noProof="0" dirty="0"/>
           </a:p>
@@ -6533,7 +6533,7 @@
           <p:cNvPr id="11" name="Marcador de contenido 10">
             <a:extLst>
               <a:ext uri="{FF2B5EF4-FFF2-40B4-BE49-F238E27FC236}">
-                <a16:creationId xmlns:a16="http://schemas.microsoft.com/office/drawing/2014/main" id="{90E23B2B-6226-4AD7-B2D1-E910F0C49BBC}"/>
+                <a16:creationId xmlns:a16="http://schemas.microsoft.com/office/drawing/2014/main" xmlns="" id="{90E23B2B-6226-4AD7-B2D1-E910F0C49BBC}"/>
               </a:ext>
             </a:extLst>
           </p:cNvPr>
@@ -6562,7 +6562,7 @@
           <p:cNvPr id="13" name="Imagen 12">
             <a:extLst>
               <a:ext uri="{FF2B5EF4-FFF2-40B4-BE49-F238E27FC236}">
-                <a16:creationId xmlns:a16="http://schemas.microsoft.com/office/drawing/2014/main" id="{1E703B05-DC1E-48B5-B6AF-20895E5546B5}"/>
+                <a16:creationId xmlns:a16="http://schemas.microsoft.com/office/drawing/2014/main" xmlns="" id="{1E703B05-DC1E-48B5-B6AF-20895E5546B5}"/>
               </a:ext>
             </a:extLst>
           </p:cNvPr>
@@ -6592,7 +6592,7 @@
           <p:cNvPr id="15" name="Imagen 14">
             <a:extLst>
               <a:ext uri="{FF2B5EF4-FFF2-40B4-BE49-F238E27FC236}">
-                <a16:creationId xmlns:a16="http://schemas.microsoft.com/office/drawing/2014/main" id="{736CDECB-9593-4F15-A27B-FBA45E140F2F}"/>
+                <a16:creationId xmlns:a16="http://schemas.microsoft.com/office/drawing/2014/main" xmlns="" id="{736CDECB-9593-4F15-A27B-FBA45E140F2F}"/>
               </a:ext>
             </a:extLst>
           </p:cNvPr>
@@ -6622,7 +6622,7 @@
           <p:cNvPr id="17" name="Imagen 16">
             <a:extLst>
               <a:ext uri="{FF2B5EF4-FFF2-40B4-BE49-F238E27FC236}">
-                <a16:creationId xmlns:a16="http://schemas.microsoft.com/office/drawing/2014/main" id="{D3952CDD-8B0E-4E00-82D0-8F98533B2003}"/>
+                <a16:creationId xmlns:a16="http://schemas.microsoft.com/office/drawing/2014/main" xmlns="" id="{D3952CDD-8B0E-4E00-82D0-8F98533B2003}"/>
               </a:ext>
             </a:extLst>
           </p:cNvPr>
@@ -6652,7 +6652,7 @@
           <p:cNvPr id="19" name="Imagen 18">
             <a:extLst>
               <a:ext uri="{FF2B5EF4-FFF2-40B4-BE49-F238E27FC236}">
-                <a16:creationId xmlns:a16="http://schemas.microsoft.com/office/drawing/2014/main" id="{6182CA79-8B4C-4BD6-B357-25587F917254}"/>
+                <a16:creationId xmlns:a16="http://schemas.microsoft.com/office/drawing/2014/main" xmlns="" id="{6182CA79-8B4C-4BD6-B357-25587F917254}"/>
               </a:ext>
             </a:extLst>
           </p:cNvPr>
@@ -6682,7 +6682,7 @@
           <p:cNvPr id="21" name="Imagen 20">
             <a:extLst>
               <a:ext uri="{FF2B5EF4-FFF2-40B4-BE49-F238E27FC236}">
-                <a16:creationId xmlns:a16="http://schemas.microsoft.com/office/drawing/2014/main" id="{CE6C3272-073F-4DC1-96F6-422304C5673E}"/>
+                <a16:creationId xmlns:a16="http://schemas.microsoft.com/office/drawing/2014/main" xmlns="" id="{CE6C3272-073F-4DC1-96F6-422304C5673E}"/>
               </a:ext>
             </a:extLst>
           </p:cNvPr>
@@ -7082,7 +7082,7 @@
           <p:cNvPr id="3" name="Marcador de contenido 2">
             <a:extLst>
               <a:ext uri="{FF2B5EF4-FFF2-40B4-BE49-F238E27FC236}">
-                <a16:creationId xmlns:a16="http://schemas.microsoft.com/office/drawing/2014/main" id="{900AC377-BD34-46B0-AD39-013F56B0CE3A}"/>
+                <a16:creationId xmlns:a16="http://schemas.microsoft.com/office/drawing/2014/main" xmlns="" id="{900AC377-BD34-46B0-AD39-013F56B0CE3A}"/>
               </a:ext>
             </a:extLst>
           </p:cNvPr>
@@ -7281,7 +7281,7 @@
           <p:cNvPr id="6" name="Marcador de contenido 5">
             <a:extLst>
               <a:ext uri="{FF2B5EF4-FFF2-40B4-BE49-F238E27FC236}">
-                <a16:creationId xmlns:a16="http://schemas.microsoft.com/office/drawing/2014/main" id="{80A254E4-7055-4B78-A757-00CE90F854DA}"/>
+                <a16:creationId xmlns:a16="http://schemas.microsoft.com/office/drawing/2014/main" xmlns="" id="{80A254E4-7055-4B78-A757-00CE90F854DA}"/>
               </a:ext>
             </a:extLst>
           </p:cNvPr>
@@ -7396,7 +7396,7 @@
           <p:cNvPr id="6" name="Marcador de contenido 5">
             <a:extLst>
               <a:ext uri="{FF2B5EF4-FFF2-40B4-BE49-F238E27FC236}">
-                <a16:creationId xmlns:a16="http://schemas.microsoft.com/office/drawing/2014/main" id="{80A254E4-7055-4B78-A757-00CE90F854DA}"/>
+                <a16:creationId xmlns:a16="http://schemas.microsoft.com/office/drawing/2014/main" xmlns="" id="{80A254E4-7055-4B78-A757-00CE90F854DA}"/>
               </a:ext>
             </a:extLst>
           </p:cNvPr>
@@ -7511,7 +7511,7 @@
           <p:cNvPr id="6" name="Marcador de contenido 5">
             <a:extLst>
               <a:ext uri="{FF2B5EF4-FFF2-40B4-BE49-F238E27FC236}">
-                <a16:creationId xmlns:a16="http://schemas.microsoft.com/office/drawing/2014/main" id="{80A254E4-7055-4B78-A757-00CE90F854DA}"/>
+                <a16:creationId xmlns:a16="http://schemas.microsoft.com/office/drawing/2014/main" xmlns="" id="{80A254E4-7055-4B78-A757-00CE90F854DA}"/>
               </a:ext>
             </a:extLst>
           </p:cNvPr>
@@ -7626,7 +7626,7 @@
           <p:cNvPr id="6" name="Marcador de contenido 5">
             <a:extLst>
               <a:ext uri="{FF2B5EF4-FFF2-40B4-BE49-F238E27FC236}">
-                <a16:creationId xmlns:a16="http://schemas.microsoft.com/office/drawing/2014/main" id="{80A254E4-7055-4B78-A757-00CE90F854DA}"/>
+                <a16:creationId xmlns:a16="http://schemas.microsoft.com/office/drawing/2014/main" xmlns="" id="{80A254E4-7055-4B78-A757-00CE90F854DA}"/>
               </a:ext>
             </a:extLst>
           </p:cNvPr>
@@ -7716,51 +7716,246 @@
           </a:p>
         </p:txBody>
       </p:sp>
-      <p:sp>
-        <p:nvSpPr>
-          <p:cNvPr id="3" name="Marcador de posición de contenido 2"/>
-          <p:cNvSpPr>
-            <a:spLocks noGrp="1"/>
-          </p:cNvSpPr>
+      <p:pic>
+        <p:nvPicPr>
+          <p:cNvPr id="4" name="Content Placeholder 3"/>
+          <p:cNvPicPr>
+            <a:picLocks noGrp="1" noChangeAspect="1"/>
+          </p:cNvPicPr>
           <p:nvPr>
             <p:ph sz="half" idx="1"/>
           </p:nvPr>
-        </p:nvSpPr>
-        <p:spPr/>
-        <p:txBody>
-          <a:bodyPr rtlCol="0"/>
-          <a:lstStyle/>
-          <a:p>
-            <a:pPr rtl="0"/>
-            <a:endParaRPr lang="es-ES" dirty="0"/>
-          </a:p>
-        </p:txBody>
-      </p:sp>
-      <p:sp>
-        <p:nvSpPr>
-          <p:cNvPr id="6" name="Marcador de contenido 5">
+        </p:nvPicPr>
+        <p:blipFill>
+          <a:blip r:embed="rId3">
             <a:extLst>
-              <a:ext uri="{FF2B5EF4-FFF2-40B4-BE49-F238E27FC236}">
-                <a16:creationId xmlns:a16="http://schemas.microsoft.com/office/drawing/2014/main" id="{80A254E4-7055-4B78-A757-00CE90F854DA}"/>
+              <a:ext uri="{28A0092B-C50C-407E-A947-70E740481C1C}">
+                <a14:useLocalDpi xmlns:a14="http://schemas.microsoft.com/office/drawing/2010/main" val="0"/>
               </a:ext>
             </a:extLst>
-          </p:cNvPr>
-          <p:cNvSpPr>
-            <a:spLocks noGrp="1"/>
-          </p:cNvSpPr>
-          <p:nvPr>
-            <p:ph sz="half" idx="2"/>
-          </p:nvPr>
-        </p:nvSpPr>
-        <p:spPr/>
-        <p:txBody>
-          <a:bodyPr/>
-          <a:lstStyle/>
-          <a:p>
-            <a:endParaRPr lang="es-ES"/>
-          </a:p>
-        </p:txBody>
-      </p:sp>
+          </a:blip>
+          <a:stretch>
+            <a:fillRect/>
+          </a:stretch>
+        </p:blipFill>
+        <p:spPr>
+          <a:xfrm>
+            <a:off x="4549227" y="1944709"/>
+            <a:ext cx="2443162" cy="4343400"/>
+          </a:xfrm>
+        </p:spPr>
+      </p:pic>
+      <p:sp>
+        <p:nvSpPr>
+          <p:cNvPr id="5" name="TextBox 4"/>
+          <p:cNvSpPr txBox="1"/>
+          <p:nvPr/>
+        </p:nvSpPr>
+        <p:spPr>
+          <a:xfrm>
+            <a:off x="296214" y="2060620"/>
+            <a:ext cx="3747752" cy="369332"/>
+          </a:xfrm>
+          <a:prstGeom prst="rect">
+            <a:avLst/>
+          </a:prstGeom>
+          <a:noFill/>
+        </p:spPr>
+        <p:txBody>
+          <a:bodyPr wrap="square" rtlCol="0">
+            <a:spAutoFit/>
+          </a:bodyPr>
+          <a:lstStyle/>
+          <a:p>
+            <a:pPr algn="r"/>
+            <a:r>
+              <a:rPr lang="es-ES" dirty="0" smtClean="0">
+                <a:latin typeface="Calibri" panose="020F0502020204030204" pitchFamily="34" charset="0"/>
+                <a:cs typeface="Calibri" panose="020F0502020204030204" pitchFamily="34" charset="0"/>
+              </a:rPr>
+              <a:t>Resultado</a:t>
+            </a:r>
+            <a:endParaRPr lang="en-GB" dirty="0">
+              <a:latin typeface="Calibri" panose="020F0502020204030204" pitchFamily="34" charset="0"/>
+              <a:cs typeface="Calibri" panose="020F0502020204030204" pitchFamily="34" charset="0"/>
+            </a:endParaRPr>
+          </a:p>
+        </p:txBody>
+      </p:sp>
+      <p:sp>
+        <p:nvSpPr>
+          <p:cNvPr id="7" name="TextBox 6"/>
+          <p:cNvSpPr txBox="1"/>
+          <p:nvPr/>
+        </p:nvSpPr>
+        <p:spPr>
+          <a:xfrm>
+            <a:off x="7471893" y="2524259"/>
+            <a:ext cx="3361386" cy="369332"/>
+          </a:xfrm>
+          <a:prstGeom prst="rect">
+            <a:avLst/>
+          </a:prstGeom>
+          <a:noFill/>
+        </p:spPr>
+        <p:txBody>
+          <a:bodyPr wrap="square" rtlCol="0">
+            <a:spAutoFit/>
+          </a:bodyPr>
+          <a:lstStyle/>
+          <a:p>
+            <a:r>
+              <a:rPr lang="es-ES" dirty="0" smtClean="0">
+                <a:latin typeface="Calibri" panose="020F0502020204030204" pitchFamily="34" charset="0"/>
+                <a:cs typeface="Calibri" panose="020F0502020204030204" pitchFamily="34" charset="0"/>
+              </a:rPr>
+              <a:t>Operador</a:t>
+            </a:r>
+          </a:p>
+        </p:txBody>
+      </p:sp>
+      <p:sp>
+        <p:nvSpPr>
+          <p:cNvPr id="8" name="TextBox 7"/>
+          <p:cNvSpPr txBox="1"/>
+          <p:nvPr/>
+        </p:nvSpPr>
+        <p:spPr>
+          <a:xfrm>
+            <a:off x="1468192" y="3198588"/>
+            <a:ext cx="2575774" cy="369332"/>
+          </a:xfrm>
+          <a:prstGeom prst="rect">
+            <a:avLst/>
+          </a:prstGeom>
+          <a:noFill/>
+        </p:spPr>
+        <p:txBody>
+          <a:bodyPr wrap="square" rtlCol="0">
+            <a:spAutoFit/>
+          </a:bodyPr>
+          <a:lstStyle/>
+          <a:p>
+            <a:pPr algn="r"/>
+            <a:r>
+              <a:rPr lang="es-ES" dirty="0" smtClean="0">
+                <a:latin typeface="Calibri" panose="020F0502020204030204" pitchFamily="34" charset="0"/>
+                <a:cs typeface="Calibri" panose="020F0502020204030204" pitchFamily="34" charset="0"/>
+              </a:rPr>
+              <a:t>Numero actual</a:t>
+            </a:r>
+            <a:endParaRPr lang="en-GB" dirty="0">
+              <a:latin typeface="Calibri" panose="020F0502020204030204" pitchFamily="34" charset="0"/>
+              <a:cs typeface="Calibri" panose="020F0502020204030204" pitchFamily="34" charset="0"/>
+            </a:endParaRPr>
+          </a:p>
+        </p:txBody>
+      </p:sp>
+      <p:cxnSp>
+        <p:nvCxnSpPr>
+          <p:cNvPr id="10" name="Straight Arrow Connector 9"/>
+          <p:cNvCxnSpPr>
+            <a:stCxn id="5" idx="3"/>
+          </p:cNvCxnSpPr>
+          <p:nvPr/>
+        </p:nvCxnSpPr>
+        <p:spPr>
+          <a:xfrm>
+            <a:off x="4043966" y="2245286"/>
+            <a:ext cx="505261" cy="0"/>
+          </a:xfrm>
+          <a:prstGeom prst="straightConnector1">
+            <a:avLst/>
+          </a:prstGeom>
+          <a:ln>
+            <a:tailEnd type="triangle"/>
+          </a:ln>
+        </p:spPr>
+        <p:style>
+          <a:lnRef idx="1">
+            <a:schemeClr val="accent1"/>
+          </a:lnRef>
+          <a:fillRef idx="0">
+            <a:schemeClr val="accent1"/>
+          </a:fillRef>
+          <a:effectRef idx="0">
+            <a:schemeClr val="accent1"/>
+          </a:effectRef>
+          <a:fontRef idx="minor">
+            <a:schemeClr val="tx1"/>
+          </a:fontRef>
+        </p:style>
+      </p:cxnSp>
+      <p:cxnSp>
+        <p:nvCxnSpPr>
+          <p:cNvPr id="12" name="Straight Arrow Connector 11"/>
+          <p:cNvCxnSpPr>
+            <a:stCxn id="7" idx="1"/>
+          </p:cNvCxnSpPr>
+          <p:nvPr/>
+        </p:nvCxnSpPr>
+        <p:spPr>
+          <a:xfrm flipH="1" flipV="1">
+            <a:off x="5370490" y="2601532"/>
+            <a:ext cx="2101403" cy="107393"/>
+          </a:xfrm>
+          <a:prstGeom prst="straightConnector1">
+            <a:avLst/>
+          </a:prstGeom>
+          <a:ln>
+            <a:tailEnd type="triangle"/>
+          </a:ln>
+        </p:spPr>
+        <p:style>
+          <a:lnRef idx="1">
+            <a:schemeClr val="accent1"/>
+          </a:lnRef>
+          <a:fillRef idx="0">
+            <a:schemeClr val="accent1"/>
+          </a:fillRef>
+          <a:effectRef idx="0">
+            <a:schemeClr val="accent1"/>
+          </a:effectRef>
+          <a:fontRef idx="minor">
+            <a:schemeClr val="tx1"/>
+          </a:fontRef>
+        </p:style>
+      </p:cxnSp>
+      <p:cxnSp>
+        <p:nvCxnSpPr>
+          <p:cNvPr id="14" name="Straight Arrow Connector 13"/>
+          <p:cNvCxnSpPr>
+            <a:stCxn id="8" idx="3"/>
+          </p:cNvCxnSpPr>
+          <p:nvPr/>
+        </p:nvCxnSpPr>
+        <p:spPr>
+          <a:xfrm flipV="1">
+            <a:off x="4043966" y="2893591"/>
+            <a:ext cx="734096" cy="489663"/>
+          </a:xfrm>
+          <a:prstGeom prst="straightConnector1">
+            <a:avLst/>
+          </a:prstGeom>
+          <a:ln>
+            <a:tailEnd type="triangle"/>
+          </a:ln>
+        </p:spPr>
+        <p:style>
+          <a:lnRef idx="1">
+            <a:schemeClr val="accent1"/>
+          </a:lnRef>
+          <a:fillRef idx="0">
+            <a:schemeClr val="accent1"/>
+          </a:fillRef>
+          <a:effectRef idx="0">
+            <a:schemeClr val="accent1"/>
+          </a:effectRef>
+          <a:fontRef idx="minor">
+            <a:schemeClr val="tx1"/>
+          </a:fontRef>
+        </p:style>
+      </p:cxnSp>
     </p:spTree>
     <p:extLst>
       <p:ext uri="{BB962C8B-B14F-4D97-AF65-F5344CB8AC3E}">
@@ -7831,48 +8026,128 @@
           </a:p>
         </p:txBody>
       </p:sp>
-      <p:sp>
-        <p:nvSpPr>
-          <p:cNvPr id="3" name="Marcador de posición de contenido 2"/>
-          <p:cNvSpPr>
-            <a:spLocks noGrp="1"/>
-          </p:cNvSpPr>
+      <p:pic>
+        <p:nvPicPr>
+          <p:cNvPr id="7" name="Content Placeholder 6"/>
+          <p:cNvPicPr>
+            <a:picLocks noGrp="1" noChangeAspect="1"/>
+          </p:cNvPicPr>
           <p:nvPr>
             <p:ph sz="half" idx="1"/>
           </p:nvPr>
-        </p:nvSpPr>
-        <p:spPr/>
-        <p:txBody>
-          <a:bodyPr rtlCol="0"/>
-          <a:lstStyle/>
-          <a:p>
-            <a:pPr rtl="0"/>
-            <a:endParaRPr lang="es-ES" dirty="0"/>
-          </a:p>
-        </p:txBody>
-      </p:sp>
-      <p:sp>
-        <p:nvSpPr>
-          <p:cNvPr id="6" name="Marcador de contenido 5">
+        </p:nvPicPr>
+        <p:blipFill>
+          <a:blip r:embed="rId3">
             <a:extLst>
-              <a:ext uri="{FF2B5EF4-FFF2-40B4-BE49-F238E27FC236}">
-                <a16:creationId xmlns:a16="http://schemas.microsoft.com/office/drawing/2014/main" id="{80A254E4-7055-4B78-A757-00CE90F854DA}"/>
+              <a:ext uri="{28A0092B-C50C-407E-A947-70E740481C1C}">
+                <a14:useLocalDpi xmlns:a14="http://schemas.microsoft.com/office/drawing/2010/main" val="0"/>
               </a:ext>
             </a:extLst>
-          </p:cNvPr>
-          <p:cNvSpPr>
-            <a:spLocks noGrp="1"/>
-          </p:cNvSpPr>
+          </a:blip>
+          <a:stretch>
+            <a:fillRect/>
+          </a:stretch>
+        </p:blipFill>
+        <p:spPr>
+          <a:xfrm>
+            <a:off x="3364370" y="1828800"/>
+            <a:ext cx="2443162" cy="4343400"/>
+          </a:xfrm>
+        </p:spPr>
+      </p:pic>
+      <p:pic>
+        <p:nvPicPr>
+          <p:cNvPr id="5" name="Content Placeholder 4"/>
+          <p:cNvPicPr>
+            <a:picLocks noGrp="1" noChangeAspect="1"/>
+          </p:cNvPicPr>
           <p:nvPr>
             <p:ph sz="half" idx="2"/>
           </p:nvPr>
-        </p:nvSpPr>
-        <p:spPr/>
-        <p:txBody>
-          <a:bodyPr/>
-          <a:lstStyle/>
-          <a:p>
-            <a:endParaRPr lang="es-ES"/>
+        </p:nvPicPr>
+        <p:blipFill>
+          <a:blip r:embed="rId4">
+            <a:extLst>
+              <a:ext uri="{28A0092B-C50C-407E-A947-70E740481C1C}">
+                <a14:useLocalDpi xmlns:a14="http://schemas.microsoft.com/office/drawing/2010/main" val="0"/>
+              </a:ext>
+            </a:extLst>
+          </a:blip>
+          <a:stretch>
+            <a:fillRect/>
+          </a:stretch>
+        </p:blipFill>
+        <p:spPr>
+          <a:xfrm>
+            <a:off x="6242799" y="1828800"/>
+            <a:ext cx="2443162" cy="4343400"/>
+          </a:xfrm>
+        </p:spPr>
+      </p:pic>
+      <p:sp>
+        <p:nvSpPr>
+          <p:cNvPr id="8" name="TextBox 7"/>
+          <p:cNvSpPr txBox="1"/>
+          <p:nvPr/>
+        </p:nvSpPr>
+        <p:spPr>
+          <a:xfrm>
+            <a:off x="274747" y="2034862"/>
+            <a:ext cx="2871989" cy="1200329"/>
+          </a:xfrm>
+          <a:prstGeom prst="rect">
+            <a:avLst/>
+          </a:prstGeom>
+          <a:noFill/>
+        </p:spPr>
+        <p:txBody>
+          <a:bodyPr wrap="square" rtlCol="0">
+            <a:spAutoFit/>
+          </a:bodyPr>
+          <a:lstStyle/>
+          <a:p>
+            <a:r>
+              <a:rPr lang="es-ES" dirty="0" smtClean="0"/>
+              <a:t>La imagen entera actúa como un botón y cambia el fondo entre el encendido y el apagado.</a:t>
+            </a:r>
+          </a:p>
+        </p:txBody>
+      </p:sp>
+      <p:sp>
+        <p:nvSpPr>
+          <p:cNvPr id="9" name="TextBox 8"/>
+          <p:cNvSpPr txBox="1"/>
+          <p:nvPr/>
+        </p:nvSpPr>
+        <p:spPr>
+          <a:xfrm>
+            <a:off x="302652" y="4842456"/>
+            <a:ext cx="2781837" cy="923330"/>
+          </a:xfrm>
+          <a:prstGeom prst="rect">
+            <a:avLst/>
+          </a:prstGeom>
+          <a:noFill/>
+        </p:spPr>
+        <p:txBody>
+          <a:bodyPr wrap="square" rtlCol="0">
+            <a:spAutoFit/>
+          </a:bodyPr>
+          <a:lstStyle/>
+          <a:p>
+            <a:r>
+              <a:rPr lang="es-ES" dirty="0" smtClean="0"/>
+              <a:t>El sonido interactúa con el </a:t>
+            </a:r>
+            <a:r>
+              <a:rPr lang="es-ES" dirty="0" err="1" smtClean="0"/>
+              <a:t>acelerómeto</a:t>
+            </a:r>
+            <a:r>
+              <a:rPr lang="es-ES" dirty="0" smtClean="0"/>
+              <a:t> del dispositivo.</a:t>
+            </a:r>
+            <a:endParaRPr lang="en-GB" dirty="0"/>
           </a:p>
         </p:txBody>
       </p:sp>

</xml_diff>

<commit_message>
pptx + dado y 3 en raya
</commit_message>
<xml_diff>
--- a/Never Bored.pptx
+++ b/Never Bored.pptx
@@ -16,8 +16,8 @@
     <p:sldId id="259" r:id="rId4"/>
     <p:sldId id="260" r:id="rId5"/>
     <p:sldId id="261" r:id="rId6"/>
-    <p:sldId id="262" r:id="rId7"/>
-    <p:sldId id="263" r:id="rId8"/>
+    <p:sldId id="266" r:id="rId7"/>
+    <p:sldId id="267" r:id="rId8"/>
     <p:sldId id="264" r:id="rId9"/>
     <p:sldId id="265" r:id="rId10"/>
   </p:sldIdLst>
@@ -213,7 +213,7 @@
             <a:pPr rtl="0"/>
             <a:fld id="{2A08F340-2088-44BB-8ED7-3D8CA093D8CF}" type="datetime1">
               <a:rPr lang="es-ES" smtClean="0"/>
-              <a:t>23/01/2019</a:t>
+              <a:t>24/01/2019</a:t>
             </a:fld>
             <a:endParaRPr lang="es-ES" dirty="0"/>
           </a:p>
@@ -281,7 +281,7 @@
             <a:pPr rtl="0"/>
             <a:fld id="{84A4F617-7A30-41D4-AB86-5D833C98E18B}" type="slidenum">
               <a:rPr lang="es-ES" smtClean="0"/>
-              <a:t>‹#›</a:t>
+              <a:t>‹Nº›</a:t>
             </a:fld>
             <a:endParaRPr lang="es-ES" dirty="0"/>
           </a:p>
@@ -383,7 +383,7 @@
             <a:pPr rtl="0"/>
             <a:fld id="{94097521-A99F-4338-BA65-8121DD1D8F63}" type="datetime1">
               <a:rPr lang="es-ES" noProof="0" smtClean="0"/>
-              <a:t>23/01/2019</a:t>
+              <a:t>24/01/2019</a:t>
             </a:fld>
             <a:endParaRPr lang="es-ES" noProof="0" dirty="0"/>
           </a:p>
@@ -544,7 +544,7 @@
             <a:pPr rtl="0"/>
             <a:fld id="{1B9A179D-2D27-49E2-B022-8EDDA2EFE682}" type="slidenum">
               <a:rPr lang="es-ES" noProof="0" smtClean="0"/>
-              <a:t>‹#›</a:t>
+              <a:t>‹Nº›</a:t>
             </a:fld>
             <a:endParaRPr lang="es-ES" noProof="0" dirty="0"/>
           </a:p>
@@ -2032,7 +2032,7 @@
             <a:pPr rtl="0"/>
             <a:fld id="{8D53C4C5-1A91-4DD5-876D-7FD06AD5DCDF}" type="datetime1">
               <a:rPr lang="es-ES" noProof="0" smtClean="0"/>
-              <a:t>23/01/2019</a:t>
+              <a:t>24/01/2019</a:t>
             </a:fld>
             <a:endParaRPr lang="es-ES" noProof="0" dirty="0"/>
           </a:p>
@@ -2056,7 +2056,7 @@
             <a:pPr rtl="0"/>
             <a:fld id="{A7F8E3F6-DE14-48B2-B2BC-6FABA9630FB8}" type="slidenum">
               <a:rPr lang="es-ES" noProof="0" smtClean="0"/>
-              <a:t>‹#›</a:t>
+              <a:t>‹Nº›</a:t>
             </a:fld>
             <a:endParaRPr lang="es-ES" noProof="0" dirty="0"/>
           </a:p>
@@ -2646,7 +2646,7 @@
             <a:pPr rtl="0"/>
             <a:fld id="{B271DCB1-EDC2-4F46-9464-E3A266B120DF}" type="datetime1">
               <a:rPr lang="es-ES" noProof="0" smtClean="0"/>
-              <a:t>23/01/2019</a:t>
+              <a:t>24/01/2019</a:t>
             </a:fld>
             <a:endParaRPr lang="es-ES" noProof="0" dirty="0"/>
           </a:p>
@@ -2670,7 +2670,7 @@
             <a:pPr rtl="0"/>
             <a:fld id="{A7F8E3F6-DE14-48B2-B2BC-6FABA9630FB8}" type="slidenum">
               <a:rPr lang="es-ES" noProof="0" smtClean="0"/>
-              <a:t>‹#›</a:t>
+              <a:t>‹Nº›</a:t>
             </a:fld>
             <a:endParaRPr lang="es-ES" noProof="0" dirty="0"/>
           </a:p>
@@ -2838,7 +2838,7 @@
             <a:pPr rtl="0"/>
             <a:fld id="{DE7A7A6C-D0B2-4914-965E-06ACC5F99020}" type="datetime1">
               <a:rPr lang="es-ES" noProof="0" smtClean="0"/>
-              <a:t>23/01/2019</a:t>
+              <a:t>24/01/2019</a:t>
             </a:fld>
             <a:endParaRPr lang="es-ES" noProof="0" dirty="0"/>
           </a:p>
@@ -2862,7 +2862,7 @@
             <a:pPr rtl="0"/>
             <a:fld id="{A7F8E3F6-DE14-48B2-B2BC-6FABA9630FB8}" type="slidenum">
               <a:rPr lang="es-ES" noProof="0" smtClean="0"/>
-              <a:t>‹#›</a:t>
+              <a:t>‹Nº›</a:t>
             </a:fld>
             <a:endParaRPr lang="es-ES" noProof="0" dirty="0"/>
           </a:p>
@@ -3180,7 +3180,7 @@
             <a:pPr rtl="0"/>
             <a:fld id="{4810A580-6A6D-4606-A8C1-2EDABCAC7FFA}" type="datetime1">
               <a:rPr lang="es-ES" noProof="0" smtClean="0"/>
-              <a:t>23/01/2019</a:t>
+              <a:t>24/01/2019</a:t>
             </a:fld>
             <a:endParaRPr lang="es-ES" noProof="0" dirty="0"/>
           </a:p>
@@ -3213,7 +3213,7 @@
             <a:fld id="{A7F8E3F6-DE14-48B2-B2BC-6FABA9630FB8}" type="slidenum">
               <a:rPr lang="es-ES" noProof="0" smtClean="0"/>
               <a:pPr rtl="0"/>
-              <a:t>‹#›</a:t>
+              <a:t>‹Nº›</a:t>
             </a:fld>
             <a:endParaRPr lang="es-ES" noProof="0" dirty="0"/>
           </a:p>
@@ -3381,7 +3381,7 @@
             <a:pPr rtl="0"/>
             <a:fld id="{BC670C18-3C4E-4264-B3DE-9642F27A7121}" type="datetime1">
               <a:rPr lang="es-ES" noProof="0" smtClean="0"/>
-              <a:t>23/01/2019</a:t>
+              <a:t>24/01/2019</a:t>
             </a:fld>
             <a:endParaRPr lang="es-ES" noProof="0" dirty="0"/>
           </a:p>
@@ -3405,7 +3405,7 @@
             <a:pPr rtl="0"/>
             <a:fld id="{A7F8E3F6-DE14-48B2-B2BC-6FABA9630FB8}" type="slidenum">
               <a:rPr lang="es-ES" noProof="0" smtClean="0"/>
-              <a:t>‹#›</a:t>
+              <a:t>‹Nº›</a:t>
             </a:fld>
             <a:endParaRPr lang="es-ES" noProof="0" dirty="0"/>
           </a:p>
@@ -4567,7 +4567,7 @@
             <a:pPr rtl="0"/>
             <a:fld id="{64214489-3716-4F2B-9EA3-68264DA40C3B}" type="datetime1">
               <a:rPr lang="es-ES" noProof="0" smtClean="0"/>
-              <a:t>23/01/2019</a:t>
+              <a:t>24/01/2019</a:t>
             </a:fld>
             <a:endParaRPr lang="es-ES" noProof="0" dirty="0"/>
           </a:p>
@@ -4591,7 +4591,7 @@
             <a:pPr rtl="0"/>
             <a:fld id="{A7F8E3F6-DE14-48B2-B2BC-6FABA9630FB8}" type="slidenum">
               <a:rPr lang="es-ES" noProof="0" smtClean="0"/>
-              <a:t>‹#›</a:t>
+              <a:t>‹Nº›</a:t>
             </a:fld>
             <a:endParaRPr lang="es-ES" noProof="0" dirty="0"/>
           </a:p>
@@ -4963,7 +4963,7 @@
             <a:pPr rtl="0"/>
             <a:fld id="{B149DA12-7EA2-4F24-BBA4-DC3176F3C47D}" type="datetime1">
               <a:rPr lang="es-ES" noProof="0" smtClean="0"/>
-              <a:t>23/01/2019</a:t>
+              <a:t>24/01/2019</a:t>
             </a:fld>
             <a:endParaRPr lang="es-ES" noProof="0" dirty="0"/>
           </a:p>
@@ -4987,7 +4987,7 @@
             <a:pPr rtl="0"/>
             <a:fld id="{A7F8E3F6-DE14-48B2-B2BC-6FABA9630FB8}" type="slidenum">
               <a:rPr lang="es-ES" noProof="0" smtClean="0"/>
-              <a:t>‹#›</a:t>
+              <a:t>‹Nº›</a:t>
             </a:fld>
             <a:endParaRPr lang="es-ES" noProof="0" dirty="0"/>
           </a:p>
@@ -5100,7 +5100,7 @@
             <a:pPr rtl="0"/>
             <a:fld id="{AF4745CB-24BB-47BC-B049-FE8587516479}" type="datetime1">
               <a:rPr lang="es-ES" noProof="0" smtClean="0"/>
-              <a:t>23/01/2019</a:t>
+              <a:t>24/01/2019</a:t>
             </a:fld>
             <a:endParaRPr lang="es-ES" noProof="0" dirty="0"/>
           </a:p>
@@ -5124,7 +5124,7 @@
             <a:pPr rtl="0"/>
             <a:fld id="{A7F8E3F6-DE14-48B2-B2BC-6FABA9630FB8}" type="slidenum">
               <a:rPr lang="es-ES" noProof="0" smtClean="0"/>
-              <a:t>‹#›</a:t>
+              <a:t>‹Nº›</a:t>
             </a:fld>
             <a:endParaRPr lang="es-ES" noProof="0" dirty="0"/>
           </a:p>
@@ -5213,7 +5213,7 @@
             <a:pPr rtl="0"/>
             <a:fld id="{79227ED3-0CC8-42FA-BA49-1120E1EE5049}" type="datetime1">
               <a:rPr lang="es-ES" noProof="0" smtClean="0"/>
-              <a:t>23/01/2019</a:t>
+              <a:t>24/01/2019</a:t>
             </a:fld>
             <a:endParaRPr lang="es-ES" noProof="0" dirty="0"/>
           </a:p>
@@ -5237,7 +5237,7 @@
             <a:pPr rtl="0"/>
             <a:fld id="{A7F8E3F6-DE14-48B2-B2BC-6FABA9630FB8}" type="slidenum">
               <a:rPr lang="es-ES" noProof="0" smtClean="0"/>
-              <a:t>‹#›</a:t>
+              <a:t>‹Nº›</a:t>
             </a:fld>
             <a:endParaRPr lang="es-ES" noProof="0" dirty="0"/>
           </a:p>
@@ -5510,7 +5510,7 @@
             <a:pPr rtl="0"/>
             <a:fld id="{1B9F5478-835E-4E07-86D2-2B2850CB71F4}" type="datetime1">
               <a:rPr lang="es-ES" noProof="0" smtClean="0"/>
-              <a:t>23/01/2019</a:t>
+              <a:t>24/01/2019</a:t>
             </a:fld>
             <a:endParaRPr lang="es-ES" noProof="0" dirty="0"/>
           </a:p>
@@ -5534,7 +5534,7 @@
             <a:pPr rtl="0"/>
             <a:fld id="{A7F8E3F6-DE14-48B2-B2BC-6FABA9630FB8}" type="slidenum">
               <a:rPr lang="es-ES" noProof="0" smtClean="0"/>
-              <a:t>‹#›</a:t>
+              <a:t>‹Nº›</a:t>
             </a:fld>
             <a:endParaRPr lang="es-ES" noProof="0" dirty="0"/>
           </a:p>
@@ -5897,7 +5897,7 @@
             <a:pPr rtl="0"/>
             <a:fld id="{1685EBF0-18CA-49C8-8074-1D88E0872D45}" type="datetime1">
               <a:rPr lang="es-ES" noProof="0" smtClean="0"/>
-              <a:t>23/01/2019</a:t>
+              <a:t>24/01/2019</a:t>
             </a:fld>
             <a:endParaRPr lang="es-ES" noProof="0" dirty="0"/>
           </a:p>
@@ -5938,7 +5938,7 @@
             <a:fld id="{A7F8E3F6-DE14-48B2-B2BC-6FABA9630FB8}" type="slidenum">
               <a:rPr lang="es-ES" noProof="0" smtClean="0"/>
               <a:pPr rtl="0"/>
-              <a:t>‹#›</a:t>
+              <a:t>‹Nº›</a:t>
             </a:fld>
             <a:endParaRPr lang="es-ES" noProof="0" dirty="0"/>
           </a:p>
@@ -6533,7 +6533,7 @@
           <p:cNvPr id="11" name="Marcador de contenido 10">
             <a:extLst>
               <a:ext uri="{FF2B5EF4-FFF2-40B4-BE49-F238E27FC236}">
-                <a16:creationId xmlns:a16="http://schemas.microsoft.com/office/drawing/2014/main" xmlns="" id="{90E23B2B-6226-4AD7-B2D1-E910F0C49BBC}"/>
+                <a16:creationId xmlns:a16="http://schemas.microsoft.com/office/drawing/2014/main" id="{90E23B2B-6226-4AD7-B2D1-E910F0C49BBC}"/>
               </a:ext>
             </a:extLst>
           </p:cNvPr>
@@ -6562,7 +6562,7 @@
           <p:cNvPr id="13" name="Imagen 12">
             <a:extLst>
               <a:ext uri="{FF2B5EF4-FFF2-40B4-BE49-F238E27FC236}">
-                <a16:creationId xmlns:a16="http://schemas.microsoft.com/office/drawing/2014/main" xmlns="" id="{1E703B05-DC1E-48B5-B6AF-20895E5546B5}"/>
+                <a16:creationId xmlns:a16="http://schemas.microsoft.com/office/drawing/2014/main" id="{1E703B05-DC1E-48B5-B6AF-20895E5546B5}"/>
               </a:ext>
             </a:extLst>
           </p:cNvPr>
@@ -6592,7 +6592,7 @@
           <p:cNvPr id="15" name="Imagen 14">
             <a:extLst>
               <a:ext uri="{FF2B5EF4-FFF2-40B4-BE49-F238E27FC236}">
-                <a16:creationId xmlns:a16="http://schemas.microsoft.com/office/drawing/2014/main" xmlns="" id="{736CDECB-9593-4F15-A27B-FBA45E140F2F}"/>
+                <a16:creationId xmlns:a16="http://schemas.microsoft.com/office/drawing/2014/main" id="{736CDECB-9593-4F15-A27B-FBA45E140F2F}"/>
               </a:ext>
             </a:extLst>
           </p:cNvPr>
@@ -6622,7 +6622,7 @@
           <p:cNvPr id="17" name="Imagen 16">
             <a:extLst>
               <a:ext uri="{FF2B5EF4-FFF2-40B4-BE49-F238E27FC236}">
-                <a16:creationId xmlns:a16="http://schemas.microsoft.com/office/drawing/2014/main" xmlns="" id="{D3952CDD-8B0E-4E00-82D0-8F98533B2003}"/>
+                <a16:creationId xmlns:a16="http://schemas.microsoft.com/office/drawing/2014/main" id="{D3952CDD-8B0E-4E00-82D0-8F98533B2003}"/>
               </a:ext>
             </a:extLst>
           </p:cNvPr>
@@ -6652,7 +6652,7 @@
           <p:cNvPr id="19" name="Imagen 18">
             <a:extLst>
               <a:ext uri="{FF2B5EF4-FFF2-40B4-BE49-F238E27FC236}">
-                <a16:creationId xmlns:a16="http://schemas.microsoft.com/office/drawing/2014/main" xmlns="" id="{6182CA79-8B4C-4BD6-B357-25587F917254}"/>
+                <a16:creationId xmlns:a16="http://schemas.microsoft.com/office/drawing/2014/main" id="{6182CA79-8B4C-4BD6-B357-25587F917254}"/>
               </a:ext>
             </a:extLst>
           </p:cNvPr>
@@ -6682,7 +6682,7 @@
           <p:cNvPr id="21" name="Imagen 20">
             <a:extLst>
               <a:ext uri="{FF2B5EF4-FFF2-40B4-BE49-F238E27FC236}">
-                <a16:creationId xmlns:a16="http://schemas.microsoft.com/office/drawing/2014/main" xmlns="" id="{CE6C3272-073F-4DC1-96F6-422304C5673E}"/>
+                <a16:creationId xmlns:a16="http://schemas.microsoft.com/office/drawing/2014/main" id="{CE6C3272-073F-4DC1-96F6-422304C5673E}"/>
               </a:ext>
             </a:extLst>
           </p:cNvPr>
@@ -7007,6 +7007,51 @@
                       </p:childTnLst>
                     </p:cTn>
                   </p:par>
+                  <p:par>
+                    <p:cTn id="27" fill="hold">
+                      <p:stCondLst>
+                        <p:cond delay="indefinite"/>
+                      </p:stCondLst>
+                      <p:childTnLst>
+                        <p:par>
+                          <p:cTn id="28" fill="hold">
+                            <p:stCondLst>
+                              <p:cond delay="0"/>
+                            </p:stCondLst>
+                            <p:childTnLst>
+                              <p:par>
+                                <p:cTn id="29" presetID="1" presetClass="entr" presetSubtype="0" fill="hold" grpId="0" nodeType="clickEffect">
+                                  <p:stCondLst>
+                                    <p:cond delay="0"/>
+                                  </p:stCondLst>
+                                  <p:childTnLst>
+                                    <p:set>
+                                      <p:cBhvr>
+                                        <p:cTn id="30" dur="1" fill="hold">
+                                          <p:stCondLst>
+                                            <p:cond delay="0"/>
+                                          </p:stCondLst>
+                                        </p:cTn>
+                                        <p:tgtEl>
+                                          <p:spTgt spid="2"/>
+                                        </p:tgtEl>
+                                        <p:attrNameLst>
+                                          <p:attrName>style.visibility</p:attrName>
+                                        </p:attrNameLst>
+                                      </p:cBhvr>
+                                      <p:to>
+                                        <p:strVal val="visible"/>
+                                      </p:to>
+                                    </p:set>
+                                  </p:childTnLst>
+                                </p:cTn>
+                              </p:par>
+                            </p:childTnLst>
+                          </p:cTn>
+                        </p:par>
+                      </p:childTnLst>
+                    </p:cTn>
+                  </p:par>
                 </p:childTnLst>
               </p:cTn>
               <p:prevCondLst>
@@ -7028,6 +7073,9 @@
         </p:cTn>
       </p:par>
     </p:tnLst>
+    <p:bldLst>
+      <p:bldP spid="2" grpId="0"/>
+    </p:bldLst>
   </p:timing>
 </p:sld>
 </file>
@@ -7082,7 +7130,7 @@
           <p:cNvPr id="3" name="Marcador de contenido 2">
             <a:extLst>
               <a:ext uri="{FF2B5EF4-FFF2-40B4-BE49-F238E27FC236}">
-                <a16:creationId xmlns:a16="http://schemas.microsoft.com/office/drawing/2014/main" xmlns="" id="{900AC377-BD34-46B0-AD39-013F56B0CE3A}"/>
+                <a16:creationId xmlns:a16="http://schemas.microsoft.com/office/drawing/2014/main" id="{900AC377-BD34-46B0-AD39-013F56B0CE3A}"/>
               </a:ext>
             </a:extLst>
           </p:cNvPr>
@@ -7281,7 +7329,7 @@
           <p:cNvPr id="6" name="Marcador de contenido 5">
             <a:extLst>
               <a:ext uri="{FF2B5EF4-FFF2-40B4-BE49-F238E27FC236}">
-                <a16:creationId xmlns:a16="http://schemas.microsoft.com/office/drawing/2014/main" xmlns="" id="{80A254E4-7055-4B78-A757-00CE90F854DA}"/>
+                <a16:creationId xmlns:a16="http://schemas.microsoft.com/office/drawing/2014/main" id="{80A254E4-7055-4B78-A757-00CE90F854DA}"/>
               </a:ext>
             </a:extLst>
           </p:cNvPr>
@@ -7396,7 +7444,7 @@
           <p:cNvPr id="6" name="Marcador de contenido 5">
             <a:extLst>
               <a:ext uri="{FF2B5EF4-FFF2-40B4-BE49-F238E27FC236}">
-                <a16:creationId xmlns:a16="http://schemas.microsoft.com/office/drawing/2014/main" xmlns="" id="{80A254E4-7055-4B78-A757-00CE90F854DA}"/>
+                <a16:creationId xmlns:a16="http://schemas.microsoft.com/office/drawing/2014/main" id="{80A254E4-7055-4B78-A757-00CE90F854DA}"/>
               </a:ext>
             </a:extLst>
           </p:cNvPr>
@@ -7486,55 +7534,412 @@
           </a:p>
         </p:txBody>
       </p:sp>
-      <p:sp>
-        <p:nvSpPr>
-          <p:cNvPr id="3" name="Marcador de posición de contenido 2"/>
-          <p:cNvSpPr>
-            <a:spLocks noGrp="1"/>
-          </p:cNvSpPr>
-          <p:nvPr>
-            <p:ph sz="half" idx="1"/>
-          </p:nvPr>
-        </p:nvSpPr>
-        <p:spPr/>
-        <p:txBody>
-          <a:bodyPr rtlCol="0"/>
-          <a:lstStyle/>
-          <a:p>
-            <a:pPr rtl="0"/>
-            <a:endParaRPr lang="es-ES" dirty="0"/>
-          </a:p>
-        </p:txBody>
-      </p:sp>
-      <p:sp>
-        <p:nvSpPr>
-          <p:cNvPr id="6" name="Marcador de contenido 5">
+      <p:pic>
+        <p:nvPicPr>
+          <p:cNvPr id="5" name="Marcador de contenido 4">
             <a:extLst>
               <a:ext uri="{FF2B5EF4-FFF2-40B4-BE49-F238E27FC236}">
-                <a16:creationId xmlns:a16="http://schemas.microsoft.com/office/drawing/2014/main" xmlns="" id="{80A254E4-7055-4B78-A757-00CE90F854DA}"/>
+                <a16:creationId xmlns:a16="http://schemas.microsoft.com/office/drawing/2014/main" id="{4276A5B2-BC28-40E7-8270-24FEF437E739}"/>
               </a:ext>
             </a:extLst>
           </p:cNvPr>
-          <p:cNvSpPr>
-            <a:spLocks noGrp="1"/>
-          </p:cNvSpPr>
+          <p:cNvPicPr>
+            <a:picLocks noGrp="1" noChangeAspect="1"/>
+          </p:cNvPicPr>
+          <p:nvPr>
+            <p:ph sz="half" idx="1"/>
+          </p:nvPr>
+        </p:nvPicPr>
+        <p:blipFill>
+          <a:blip r:embed="rId3"/>
+          <a:stretch>
+            <a:fillRect/>
+          </a:stretch>
+        </p:blipFill>
+        <p:spPr>
+          <a:xfrm>
+            <a:off x="1535983" y="1560391"/>
+            <a:ext cx="2421060" cy="4343399"/>
+          </a:xfrm>
+        </p:spPr>
+      </p:pic>
+      <p:pic>
+        <p:nvPicPr>
+          <p:cNvPr id="8" name="Marcador de contenido 7">
+            <a:extLst>
+              <a:ext uri="{FF2B5EF4-FFF2-40B4-BE49-F238E27FC236}">
+                <a16:creationId xmlns:a16="http://schemas.microsoft.com/office/drawing/2014/main" id="{EFD73122-C74A-4987-9F17-5BC23228A2AA}"/>
+              </a:ext>
+            </a:extLst>
+          </p:cNvPr>
+          <p:cNvPicPr>
+            <a:picLocks noGrp="1" noChangeAspect="1"/>
+          </p:cNvPicPr>
           <p:nvPr>
             <p:ph sz="half" idx="2"/>
           </p:nvPr>
-        </p:nvSpPr>
-        <p:spPr/>
-        <p:txBody>
-          <a:bodyPr/>
-          <a:lstStyle/>
-          <a:p>
+        </p:nvPicPr>
+        <p:blipFill>
+          <a:blip r:embed="rId4"/>
+          <a:stretch>
+            <a:fillRect/>
+          </a:stretch>
+        </p:blipFill>
+        <p:spPr>
+          <a:xfrm>
+            <a:off x="5359235" y="1560390"/>
+            <a:ext cx="2421060" cy="4343400"/>
+          </a:xfrm>
+        </p:spPr>
+      </p:pic>
+      <p:sp>
+        <p:nvSpPr>
+          <p:cNvPr id="3" name="CuadroTexto 2">
+            <a:extLst>
+              <a:ext uri="{FF2B5EF4-FFF2-40B4-BE49-F238E27FC236}">
+                <a16:creationId xmlns:a16="http://schemas.microsoft.com/office/drawing/2014/main" id="{C47D05DE-D2C9-475F-8C1E-22053C4485B9}"/>
+              </a:ext>
+            </a:extLst>
+          </p:cNvPr>
+          <p:cNvSpPr txBox="1"/>
+          <p:nvPr/>
+        </p:nvSpPr>
+        <p:spPr>
+          <a:xfrm>
+            <a:off x="1655887" y="5849029"/>
+            <a:ext cx="2181252" cy="646331"/>
+          </a:xfrm>
+          <a:prstGeom prst="rect">
+            <a:avLst/>
+          </a:prstGeom>
+          <a:noFill/>
+        </p:spPr>
+        <p:txBody>
+          <a:bodyPr wrap="square" rtlCol="0">
+            <a:spAutoFit/>
+          </a:bodyPr>
+          <a:lstStyle/>
+          <a:p>
+            <a:pPr algn="ctr"/>
+            <a:r>
+              <a:rPr lang="es-ES" b="1" dirty="0">
+                <a:solidFill>
+                  <a:schemeClr val="accent1">
+                    <a:lumMod val="50000"/>
+                  </a:schemeClr>
+                </a:solidFill>
+                <a:latin typeface="Arial" panose="020B0604020202020204" pitchFamily="34" charset="0"/>
+                <a:cs typeface="Arial" panose="020B0604020202020204" pitchFamily="34" charset="0"/>
+              </a:rPr>
+              <a:t>Funcionalidades </a:t>
+            </a:r>
+          </a:p>
+          <a:p>
+            <a:pPr algn="ctr"/>
+            <a:r>
+              <a:rPr lang="es-ES" b="1" dirty="0">
+                <a:solidFill>
+                  <a:schemeClr val="accent1">
+                    <a:lumMod val="50000"/>
+                  </a:schemeClr>
+                </a:solidFill>
+                <a:latin typeface="Arial" panose="020B0604020202020204" pitchFamily="34" charset="0"/>
+                <a:cs typeface="Arial" panose="020B0604020202020204" pitchFamily="34" charset="0"/>
+              </a:rPr>
+              <a:t>básicas</a:t>
+            </a:r>
+          </a:p>
+        </p:txBody>
+      </p:sp>
+      <p:sp>
+        <p:nvSpPr>
+          <p:cNvPr id="6" name="CuadroTexto 5">
+            <a:extLst>
+              <a:ext uri="{FF2B5EF4-FFF2-40B4-BE49-F238E27FC236}">
+                <a16:creationId xmlns:a16="http://schemas.microsoft.com/office/drawing/2014/main" id="{08AC3198-EEDF-40FD-9E30-39A6F2C8E7C8}"/>
+              </a:ext>
+            </a:extLst>
+          </p:cNvPr>
+          <p:cNvSpPr txBox="1"/>
+          <p:nvPr/>
+        </p:nvSpPr>
+        <p:spPr>
+          <a:xfrm>
+            <a:off x="5197848" y="5849030"/>
+            <a:ext cx="2743834" cy="646331"/>
+          </a:xfrm>
+          <a:prstGeom prst="rect">
+            <a:avLst/>
+          </a:prstGeom>
+          <a:noFill/>
+        </p:spPr>
+        <p:txBody>
+          <a:bodyPr wrap="square" rtlCol="0">
+            <a:spAutoFit/>
+          </a:bodyPr>
+          <a:lstStyle/>
+          <a:p>
+            <a:pPr algn="ctr"/>
+            <a:r>
+              <a:rPr lang="es-ES" b="1" dirty="0">
+                <a:solidFill>
+                  <a:schemeClr val="accent1">
+                    <a:lumMod val="50000"/>
+                  </a:schemeClr>
+                </a:solidFill>
+                <a:latin typeface="Arial" panose="020B0604020202020204" pitchFamily="34" charset="0"/>
+                <a:cs typeface="Arial" panose="020B0604020202020204" pitchFamily="34" charset="0"/>
+              </a:rPr>
+              <a:t>Funcionalidades </a:t>
+            </a:r>
+          </a:p>
+          <a:p>
+            <a:pPr algn="ctr"/>
+            <a:r>
+              <a:rPr lang="es-ES" b="1" dirty="0">
+                <a:solidFill>
+                  <a:schemeClr val="accent1">
+                    <a:lumMod val="50000"/>
+                  </a:schemeClr>
+                </a:solidFill>
+                <a:latin typeface="Arial" panose="020B0604020202020204" pitchFamily="34" charset="0"/>
+                <a:cs typeface="Arial" panose="020B0604020202020204" pitchFamily="34" charset="0"/>
+              </a:rPr>
+              <a:t>adicionales</a:t>
+            </a:r>
+          </a:p>
+        </p:txBody>
+      </p:sp>
+      <p:sp>
+        <p:nvSpPr>
+          <p:cNvPr id="7" name="CuadroTexto 6">
+            <a:extLst>
+              <a:ext uri="{FF2B5EF4-FFF2-40B4-BE49-F238E27FC236}">
+                <a16:creationId xmlns:a16="http://schemas.microsoft.com/office/drawing/2014/main" id="{0D2272CD-3F92-44CE-9F62-88E14FBAA171}"/>
+              </a:ext>
+            </a:extLst>
+          </p:cNvPr>
+          <p:cNvSpPr txBox="1"/>
+          <p:nvPr/>
+        </p:nvSpPr>
+        <p:spPr>
+          <a:xfrm>
+            <a:off x="8851183" y="5849029"/>
+            <a:ext cx="2181252" cy="646331"/>
+          </a:xfrm>
+          <a:prstGeom prst="rect">
+            <a:avLst/>
+          </a:prstGeom>
+          <a:noFill/>
+        </p:spPr>
+        <p:txBody>
+          <a:bodyPr wrap="square" rtlCol="0">
+            <a:spAutoFit/>
+          </a:bodyPr>
+          <a:lstStyle/>
+          <a:p>
+            <a:pPr algn="ctr"/>
+            <a:r>
+              <a:rPr lang="es-ES" b="1" dirty="0">
+                <a:solidFill>
+                  <a:schemeClr val="accent1">
+                    <a:lumMod val="50000"/>
+                  </a:schemeClr>
+                </a:solidFill>
+                <a:latin typeface="Arial" panose="020B0604020202020204" pitchFamily="34" charset="0"/>
+                <a:cs typeface="Arial" panose="020B0604020202020204" pitchFamily="34" charset="0"/>
+              </a:rPr>
+              <a:t>Mejora de diseño</a:t>
+            </a:r>
+          </a:p>
+          <a:p>
+            <a:pPr algn="ctr"/>
+            <a:r>
+              <a:rPr lang="es-ES" b="1" dirty="0">
+                <a:solidFill>
+                  <a:schemeClr val="accent1">
+                    <a:lumMod val="50000"/>
+                  </a:schemeClr>
+                </a:solidFill>
+                <a:latin typeface="Arial" panose="020B0604020202020204" pitchFamily="34" charset="0"/>
+                <a:cs typeface="Arial" panose="020B0604020202020204" pitchFamily="34" charset="0"/>
+              </a:rPr>
+              <a:t>y </a:t>
+            </a:r>
+            <a:r>
+              <a:rPr lang="es-ES" b="1" dirty="0" err="1">
+                <a:solidFill>
+                  <a:schemeClr val="accent1">
+                    <a:lumMod val="50000"/>
+                  </a:schemeClr>
+                </a:solidFill>
+                <a:latin typeface="Arial" panose="020B0604020202020204" pitchFamily="34" charset="0"/>
+                <a:cs typeface="Arial" panose="020B0604020202020204" pitchFamily="34" charset="0"/>
+              </a:rPr>
+              <a:t>layout</a:t>
+            </a:r>
+            <a:endParaRPr lang="es-ES" b="1" dirty="0">
+              <a:solidFill>
+                <a:schemeClr val="accent1">
+                  <a:lumMod val="50000"/>
+                </a:schemeClr>
+              </a:solidFill>
+              <a:latin typeface="Arial" panose="020B0604020202020204" pitchFamily="34" charset="0"/>
+              <a:cs typeface="Arial" panose="020B0604020202020204" pitchFamily="34" charset="0"/>
+            </a:endParaRPr>
+          </a:p>
+        </p:txBody>
+      </p:sp>
+      <p:sp>
+        <p:nvSpPr>
+          <p:cNvPr id="4" name="Flecha: a la derecha 3">
+            <a:extLst>
+              <a:ext uri="{FF2B5EF4-FFF2-40B4-BE49-F238E27FC236}">
+                <a16:creationId xmlns:a16="http://schemas.microsoft.com/office/drawing/2014/main" id="{6BB8E3FB-CDF0-4CC2-A6B0-323E71928750}"/>
+              </a:ext>
+            </a:extLst>
+          </p:cNvPr>
+          <p:cNvSpPr/>
+          <p:nvPr/>
+        </p:nvSpPr>
+        <p:spPr>
+          <a:xfrm>
+            <a:off x="4214191" y="3299791"/>
+            <a:ext cx="715618" cy="344557"/>
+          </a:xfrm>
+          <a:prstGeom prst="rightArrow">
+            <a:avLst/>
+          </a:prstGeom>
+          <a:solidFill>
+            <a:schemeClr val="accent1">
+              <a:lumMod val="50000"/>
+            </a:schemeClr>
+          </a:solidFill>
+          <a:ln>
+            <a:solidFill>
+              <a:schemeClr val="accent1">
+                <a:lumMod val="50000"/>
+              </a:schemeClr>
+            </a:solidFill>
+          </a:ln>
+        </p:spPr>
+        <p:style>
+          <a:lnRef idx="2">
+            <a:schemeClr val="accent1">
+              <a:shade val="50000"/>
+            </a:schemeClr>
+          </a:lnRef>
+          <a:fillRef idx="1">
+            <a:schemeClr val="accent1"/>
+          </a:fillRef>
+          <a:effectRef idx="0">
+            <a:schemeClr val="accent1"/>
+          </a:effectRef>
+          <a:fontRef idx="minor">
+            <a:schemeClr val="lt1"/>
+          </a:fontRef>
+        </p:style>
+        <p:txBody>
+          <a:bodyPr rtlCol="0" anchor="ctr"/>
+          <a:lstStyle/>
+          <a:p>
+            <a:pPr algn="ctr"/>
             <a:endParaRPr lang="es-ES"/>
           </a:p>
         </p:txBody>
       </p:sp>
+      <p:sp>
+        <p:nvSpPr>
+          <p:cNvPr id="9" name="Flecha: a la derecha 8">
+            <a:extLst>
+              <a:ext uri="{FF2B5EF4-FFF2-40B4-BE49-F238E27FC236}">
+                <a16:creationId xmlns:a16="http://schemas.microsoft.com/office/drawing/2014/main" id="{A4AB9F7B-EDBE-44DA-8D9C-A2F44ABE57E3}"/>
+              </a:ext>
+            </a:extLst>
+          </p:cNvPr>
+          <p:cNvSpPr/>
+          <p:nvPr/>
+        </p:nvSpPr>
+        <p:spPr>
+          <a:xfrm>
+            <a:off x="8057321" y="3299790"/>
+            <a:ext cx="715618" cy="344557"/>
+          </a:xfrm>
+          <a:prstGeom prst="rightArrow">
+            <a:avLst/>
+          </a:prstGeom>
+          <a:solidFill>
+            <a:schemeClr val="accent1">
+              <a:lumMod val="50000"/>
+            </a:schemeClr>
+          </a:solidFill>
+          <a:ln>
+            <a:solidFill>
+              <a:schemeClr val="accent1">
+                <a:lumMod val="50000"/>
+              </a:schemeClr>
+            </a:solidFill>
+          </a:ln>
+        </p:spPr>
+        <p:style>
+          <a:lnRef idx="2">
+            <a:schemeClr val="accent1">
+              <a:shade val="50000"/>
+            </a:schemeClr>
+          </a:lnRef>
+          <a:fillRef idx="1">
+            <a:schemeClr val="accent1"/>
+          </a:fillRef>
+          <a:effectRef idx="0">
+            <a:schemeClr val="accent1"/>
+          </a:effectRef>
+          <a:fontRef idx="minor">
+            <a:schemeClr val="lt1"/>
+          </a:fontRef>
+        </p:style>
+        <p:txBody>
+          <a:bodyPr rtlCol="0" anchor="ctr"/>
+          <a:lstStyle/>
+          <a:p>
+            <a:pPr algn="ctr"/>
+            <a:endParaRPr lang="es-ES"/>
+          </a:p>
+        </p:txBody>
+      </p:sp>
+      <p:pic>
+        <p:nvPicPr>
+          <p:cNvPr id="11" name="Imagen 10">
+            <a:extLst>
+              <a:ext uri="{FF2B5EF4-FFF2-40B4-BE49-F238E27FC236}">
+                <a16:creationId xmlns:a16="http://schemas.microsoft.com/office/drawing/2014/main" id="{364731DB-10B6-4967-8E49-16EC98E72202}"/>
+              </a:ext>
+            </a:extLst>
+          </p:cNvPr>
+          <p:cNvPicPr>
+            <a:picLocks noChangeAspect="1"/>
+          </p:cNvPicPr>
+          <p:nvPr/>
+        </p:nvPicPr>
+        <p:blipFill>
+          <a:blip r:embed="rId5"/>
+          <a:stretch>
+            <a:fillRect/>
+          </a:stretch>
+        </p:blipFill>
+        <p:spPr>
+          <a:xfrm>
+            <a:off x="8851183" y="1560390"/>
+            <a:ext cx="2421060" cy="4288639"/>
+          </a:xfrm>
+          <a:prstGeom prst="rect">
+            <a:avLst/>
+          </a:prstGeom>
+        </p:spPr>
+      </p:pic>
     </p:spTree>
     <p:extLst>
       <p:ext uri="{BB962C8B-B14F-4D97-AF65-F5344CB8AC3E}">
-        <p14:creationId xmlns:p14="http://schemas.microsoft.com/office/powerpoint/2010/main" val="534989477"/>
+        <p14:creationId xmlns:p14="http://schemas.microsoft.com/office/powerpoint/2010/main" val="2256619641"/>
       </p:ext>
     </p:extLst>
   </p:cSld>
@@ -7553,6 +7958,313 @@
       </p:transition>
     </mc:Fallback>
   </mc:AlternateContent>
+  <p:timing>
+    <p:tnLst>
+      <p:par>
+        <p:cTn id="1" dur="indefinite" restart="never" nodeType="tmRoot">
+          <p:childTnLst>
+            <p:seq concurrent="1" nextAc="seek">
+              <p:cTn id="2" dur="indefinite" nodeType="mainSeq">
+                <p:childTnLst>
+                  <p:par>
+                    <p:cTn id="3" fill="hold">
+                      <p:stCondLst>
+                        <p:cond delay="indefinite"/>
+                      </p:stCondLst>
+                      <p:childTnLst>
+                        <p:par>
+                          <p:cTn id="4" fill="hold">
+                            <p:stCondLst>
+                              <p:cond delay="0"/>
+                            </p:stCondLst>
+                            <p:childTnLst>
+                              <p:par>
+                                <p:cTn id="5" presetID="1" presetClass="entr" presetSubtype="0" fill="hold" nodeType="clickEffect">
+                                  <p:stCondLst>
+                                    <p:cond delay="0"/>
+                                  </p:stCondLst>
+                                  <p:childTnLst>
+                                    <p:set>
+                                      <p:cBhvr>
+                                        <p:cTn id="6" dur="1" fill="hold">
+                                          <p:stCondLst>
+                                            <p:cond delay="0"/>
+                                          </p:stCondLst>
+                                        </p:cTn>
+                                        <p:tgtEl>
+                                          <p:spTgt spid="5"/>
+                                        </p:tgtEl>
+                                        <p:attrNameLst>
+                                          <p:attrName>style.visibility</p:attrName>
+                                        </p:attrNameLst>
+                                      </p:cBhvr>
+                                      <p:to>
+                                        <p:strVal val="visible"/>
+                                      </p:to>
+                                    </p:set>
+                                  </p:childTnLst>
+                                </p:cTn>
+                              </p:par>
+                              <p:par>
+                                <p:cTn id="7" presetID="1" presetClass="entr" presetSubtype="0" fill="hold" grpId="0" nodeType="withEffect">
+                                  <p:stCondLst>
+                                    <p:cond delay="0"/>
+                                  </p:stCondLst>
+                                  <p:childTnLst>
+                                    <p:set>
+                                      <p:cBhvr>
+                                        <p:cTn id="8" dur="1" fill="hold">
+                                          <p:stCondLst>
+                                            <p:cond delay="0"/>
+                                          </p:stCondLst>
+                                        </p:cTn>
+                                        <p:tgtEl>
+                                          <p:spTgt spid="3"/>
+                                        </p:tgtEl>
+                                        <p:attrNameLst>
+                                          <p:attrName>style.visibility</p:attrName>
+                                        </p:attrNameLst>
+                                      </p:cBhvr>
+                                      <p:to>
+                                        <p:strVal val="visible"/>
+                                      </p:to>
+                                    </p:set>
+                                  </p:childTnLst>
+                                </p:cTn>
+                              </p:par>
+                            </p:childTnLst>
+                          </p:cTn>
+                        </p:par>
+                      </p:childTnLst>
+                    </p:cTn>
+                  </p:par>
+                  <p:par>
+                    <p:cTn id="9" fill="hold">
+                      <p:stCondLst>
+                        <p:cond delay="indefinite"/>
+                      </p:stCondLst>
+                      <p:childTnLst>
+                        <p:par>
+                          <p:cTn id="10" fill="hold">
+                            <p:stCondLst>
+                              <p:cond delay="0"/>
+                            </p:stCondLst>
+                            <p:childTnLst>
+                              <p:par>
+                                <p:cTn id="11" presetID="1" presetClass="entr" presetSubtype="0" fill="hold" grpId="0" nodeType="clickEffect">
+                                  <p:stCondLst>
+                                    <p:cond delay="0"/>
+                                  </p:stCondLst>
+                                  <p:childTnLst>
+                                    <p:set>
+                                      <p:cBhvr>
+                                        <p:cTn id="12" dur="1" fill="hold">
+                                          <p:stCondLst>
+                                            <p:cond delay="0"/>
+                                          </p:stCondLst>
+                                        </p:cTn>
+                                        <p:tgtEl>
+                                          <p:spTgt spid="4"/>
+                                        </p:tgtEl>
+                                        <p:attrNameLst>
+                                          <p:attrName>style.visibility</p:attrName>
+                                        </p:attrNameLst>
+                                      </p:cBhvr>
+                                      <p:to>
+                                        <p:strVal val="visible"/>
+                                      </p:to>
+                                    </p:set>
+                                  </p:childTnLst>
+                                </p:cTn>
+                              </p:par>
+                              <p:par>
+                                <p:cTn id="13" presetID="1" presetClass="entr" presetSubtype="0" fill="hold" nodeType="withEffect">
+                                  <p:stCondLst>
+                                    <p:cond delay="0"/>
+                                  </p:stCondLst>
+                                  <p:childTnLst>
+                                    <p:set>
+                                      <p:cBhvr>
+                                        <p:cTn id="14" dur="1" fill="hold">
+                                          <p:stCondLst>
+                                            <p:cond delay="0"/>
+                                          </p:stCondLst>
+                                        </p:cTn>
+                                        <p:tgtEl>
+                                          <p:spTgt spid="8"/>
+                                        </p:tgtEl>
+                                        <p:attrNameLst>
+                                          <p:attrName>style.visibility</p:attrName>
+                                        </p:attrNameLst>
+                                      </p:cBhvr>
+                                      <p:to>
+                                        <p:strVal val="visible"/>
+                                      </p:to>
+                                    </p:set>
+                                  </p:childTnLst>
+                                </p:cTn>
+                              </p:par>
+                              <p:par>
+                                <p:cTn id="15" presetID="1" presetClass="entr" presetSubtype="0" fill="hold" grpId="0" nodeType="withEffect">
+                                  <p:stCondLst>
+                                    <p:cond delay="0"/>
+                                  </p:stCondLst>
+                                  <p:childTnLst>
+                                    <p:set>
+                                      <p:cBhvr>
+                                        <p:cTn id="16" dur="1" fill="hold">
+                                          <p:stCondLst>
+                                            <p:cond delay="0"/>
+                                          </p:stCondLst>
+                                        </p:cTn>
+                                        <p:tgtEl>
+                                          <p:spTgt spid="6"/>
+                                        </p:tgtEl>
+                                        <p:attrNameLst>
+                                          <p:attrName>style.visibility</p:attrName>
+                                        </p:attrNameLst>
+                                      </p:cBhvr>
+                                      <p:to>
+                                        <p:strVal val="visible"/>
+                                      </p:to>
+                                    </p:set>
+                                  </p:childTnLst>
+                                </p:cTn>
+                              </p:par>
+                            </p:childTnLst>
+                          </p:cTn>
+                        </p:par>
+                      </p:childTnLst>
+                    </p:cTn>
+                  </p:par>
+                  <p:par>
+                    <p:cTn id="17" fill="hold">
+                      <p:stCondLst>
+                        <p:cond delay="indefinite"/>
+                      </p:stCondLst>
+                      <p:childTnLst>
+                        <p:par>
+                          <p:cTn id="18" fill="hold">
+                            <p:stCondLst>
+                              <p:cond delay="0"/>
+                            </p:stCondLst>
+                            <p:childTnLst>
+                              <p:par>
+                                <p:cTn id="19" presetID="1" presetClass="entr" presetSubtype="0" fill="hold" grpId="0" nodeType="clickEffect">
+                                  <p:stCondLst>
+                                    <p:cond delay="0"/>
+                                  </p:stCondLst>
+                                  <p:childTnLst>
+                                    <p:set>
+                                      <p:cBhvr>
+                                        <p:cTn id="20" dur="1" fill="hold">
+                                          <p:stCondLst>
+                                            <p:cond delay="0"/>
+                                          </p:stCondLst>
+                                        </p:cTn>
+                                        <p:tgtEl>
+                                          <p:spTgt spid="9"/>
+                                        </p:tgtEl>
+                                        <p:attrNameLst>
+                                          <p:attrName>style.visibility</p:attrName>
+                                        </p:attrNameLst>
+                                      </p:cBhvr>
+                                      <p:to>
+                                        <p:strVal val="visible"/>
+                                      </p:to>
+                                    </p:set>
+                                  </p:childTnLst>
+                                </p:cTn>
+                              </p:par>
+                              <p:par>
+                                <p:cTn id="21" presetID="1" presetClass="entr" presetSubtype="0" fill="hold" grpId="0" nodeType="withEffect">
+                                  <p:stCondLst>
+                                    <p:cond delay="0"/>
+                                  </p:stCondLst>
+                                  <p:childTnLst>
+                                    <p:set>
+                                      <p:cBhvr>
+                                        <p:cTn id="22" dur="1" fill="hold">
+                                          <p:stCondLst>
+                                            <p:cond delay="0"/>
+                                          </p:stCondLst>
+                                        </p:cTn>
+                                        <p:tgtEl>
+                                          <p:spTgt spid="7"/>
+                                        </p:tgtEl>
+                                        <p:attrNameLst>
+                                          <p:attrName>style.visibility</p:attrName>
+                                        </p:attrNameLst>
+                                      </p:cBhvr>
+                                      <p:to>
+                                        <p:strVal val="visible"/>
+                                      </p:to>
+                                    </p:set>
+                                  </p:childTnLst>
+                                </p:cTn>
+                              </p:par>
+                              <p:par>
+                                <p:cTn id="23" presetID="1" presetClass="entr" presetSubtype="0" fill="hold" nodeType="withEffect">
+                                  <p:stCondLst>
+                                    <p:cond delay="0"/>
+                                  </p:stCondLst>
+                                  <p:childTnLst>
+                                    <p:set>
+                                      <p:cBhvr>
+                                        <p:cTn id="24" dur="1" fill="hold">
+                                          <p:stCondLst>
+                                            <p:cond delay="0"/>
+                                          </p:stCondLst>
+                                        </p:cTn>
+                                        <p:tgtEl>
+                                          <p:spTgt spid="11"/>
+                                        </p:tgtEl>
+                                        <p:attrNameLst>
+                                          <p:attrName>style.visibility</p:attrName>
+                                        </p:attrNameLst>
+                                      </p:cBhvr>
+                                      <p:to>
+                                        <p:strVal val="visible"/>
+                                      </p:to>
+                                    </p:set>
+                                  </p:childTnLst>
+                                </p:cTn>
+                              </p:par>
+                            </p:childTnLst>
+                          </p:cTn>
+                        </p:par>
+                      </p:childTnLst>
+                    </p:cTn>
+                  </p:par>
+                </p:childTnLst>
+              </p:cTn>
+              <p:prevCondLst>
+                <p:cond evt="onPrev" delay="0">
+                  <p:tgtEl>
+                    <p:sldTgt/>
+                  </p:tgtEl>
+                </p:cond>
+              </p:prevCondLst>
+              <p:nextCondLst>
+                <p:cond evt="onNext" delay="0">
+                  <p:tgtEl>
+                    <p:sldTgt/>
+                  </p:tgtEl>
+                </p:cond>
+              </p:nextCondLst>
+            </p:seq>
+          </p:childTnLst>
+        </p:cTn>
+      </p:par>
+    </p:tnLst>
+    <p:bldLst>
+      <p:bldP spid="3" grpId="0"/>
+      <p:bldP spid="6" grpId="0"/>
+      <p:bldP spid="7" grpId="0"/>
+      <p:bldP spid="4" grpId="0" animBg="1"/>
+      <p:bldP spid="9" grpId="0" animBg="1"/>
+    </p:bldLst>
+  </p:timing>
 </p:sld>
 </file>
 
@@ -7601,47 +8313,242 @@
           </a:p>
         </p:txBody>
       </p:sp>
-      <p:sp>
-        <p:nvSpPr>
-          <p:cNvPr id="3" name="Marcador de posición de contenido 2"/>
-          <p:cNvSpPr>
-            <a:spLocks noGrp="1"/>
-          </p:cNvSpPr>
-          <p:nvPr>
-            <p:ph sz="half" idx="1"/>
-          </p:nvPr>
-        </p:nvSpPr>
-        <p:spPr/>
-        <p:txBody>
-          <a:bodyPr rtlCol="0"/>
-          <a:lstStyle/>
-          <a:p>
-            <a:pPr rtl="0"/>
-            <a:endParaRPr lang="es-ES" dirty="0"/>
-          </a:p>
-        </p:txBody>
-      </p:sp>
-      <p:sp>
-        <p:nvSpPr>
-          <p:cNvPr id="6" name="Marcador de contenido 5">
+      <p:pic>
+        <p:nvPicPr>
+          <p:cNvPr id="8" name="Marcador de contenido 7">
             <a:extLst>
               <a:ext uri="{FF2B5EF4-FFF2-40B4-BE49-F238E27FC236}">
-                <a16:creationId xmlns:a16="http://schemas.microsoft.com/office/drawing/2014/main" xmlns="" id="{80A254E4-7055-4B78-A757-00CE90F854DA}"/>
+                <a16:creationId xmlns:a16="http://schemas.microsoft.com/office/drawing/2014/main" id="{9AFE9CF2-5F1A-402B-A09F-BDC2477D69DB}"/>
               </a:ext>
             </a:extLst>
           </p:cNvPr>
-          <p:cNvSpPr>
-            <a:spLocks noGrp="1"/>
-          </p:cNvSpPr>
+          <p:cNvPicPr>
+            <a:picLocks noGrp="1" noChangeAspect="1"/>
+          </p:cNvPicPr>
+          <p:nvPr>
+            <p:ph sz="half" idx="1"/>
+          </p:nvPr>
+        </p:nvPicPr>
+        <p:blipFill>
+          <a:blip r:embed="rId3"/>
+          <a:stretch>
+            <a:fillRect/>
+          </a:stretch>
+        </p:blipFill>
+        <p:spPr>
+          <a:xfrm>
+            <a:off x="2265489" y="1613135"/>
+            <a:ext cx="2452959" cy="4362939"/>
+          </a:xfrm>
+        </p:spPr>
+      </p:pic>
+      <p:pic>
+        <p:nvPicPr>
+          <p:cNvPr id="5" name="Marcador de contenido 4">
+            <a:extLst>
+              <a:ext uri="{FF2B5EF4-FFF2-40B4-BE49-F238E27FC236}">
+                <a16:creationId xmlns:a16="http://schemas.microsoft.com/office/drawing/2014/main" id="{E19A9255-000E-4AFB-B610-D4D465731206}"/>
+              </a:ext>
+            </a:extLst>
+          </p:cNvPr>
+          <p:cNvPicPr>
+            <a:picLocks noGrp="1" noChangeAspect="1"/>
+          </p:cNvPicPr>
           <p:nvPr>
             <p:ph sz="half" idx="2"/>
           </p:nvPr>
-        </p:nvSpPr>
-        <p:spPr/>
-        <p:txBody>
-          <a:bodyPr/>
-          <a:lstStyle/>
-          <a:p>
+        </p:nvPicPr>
+        <p:blipFill>
+          <a:blip r:embed="rId4"/>
+          <a:stretch>
+            <a:fillRect/>
+          </a:stretch>
+        </p:blipFill>
+        <p:spPr>
+          <a:xfrm>
+            <a:off x="7473551" y="1603365"/>
+            <a:ext cx="2452960" cy="4343400"/>
+          </a:xfrm>
+        </p:spPr>
+      </p:pic>
+      <p:sp>
+        <p:nvSpPr>
+          <p:cNvPr id="6" name="CuadroTexto 5">
+            <a:extLst>
+              <a:ext uri="{FF2B5EF4-FFF2-40B4-BE49-F238E27FC236}">
+                <a16:creationId xmlns:a16="http://schemas.microsoft.com/office/drawing/2014/main" id="{133C1CBE-B0B7-4439-9C94-F3660A7418C5}"/>
+              </a:ext>
+            </a:extLst>
+          </p:cNvPr>
+          <p:cNvSpPr txBox="1"/>
+          <p:nvPr/>
+        </p:nvSpPr>
+        <p:spPr>
+          <a:xfrm>
+            <a:off x="2401344" y="5943304"/>
+            <a:ext cx="2181252" cy="646331"/>
+          </a:xfrm>
+          <a:prstGeom prst="rect">
+            <a:avLst/>
+          </a:prstGeom>
+          <a:noFill/>
+        </p:spPr>
+        <p:txBody>
+          <a:bodyPr wrap="square" rtlCol="0">
+            <a:spAutoFit/>
+          </a:bodyPr>
+          <a:lstStyle/>
+          <a:p>
+            <a:pPr algn="ctr"/>
+            <a:r>
+              <a:rPr lang="es-ES" b="1" dirty="0">
+                <a:solidFill>
+                  <a:schemeClr val="accent1">
+                    <a:lumMod val="50000"/>
+                  </a:schemeClr>
+                </a:solidFill>
+                <a:latin typeface="Arial" panose="020B0604020202020204" pitchFamily="34" charset="0"/>
+                <a:cs typeface="Arial" panose="020B0604020202020204" pitchFamily="34" charset="0"/>
+              </a:rPr>
+              <a:t>Funcionalidad </a:t>
+            </a:r>
+          </a:p>
+          <a:p>
+            <a:pPr algn="ctr"/>
+            <a:r>
+              <a:rPr lang="es-ES" b="1" dirty="0">
+                <a:solidFill>
+                  <a:schemeClr val="accent1">
+                    <a:lumMod val="50000"/>
+                  </a:schemeClr>
+                </a:solidFill>
+                <a:latin typeface="Arial" panose="020B0604020202020204" pitchFamily="34" charset="0"/>
+                <a:cs typeface="Arial" panose="020B0604020202020204" pitchFamily="34" charset="0"/>
+              </a:rPr>
+              <a:t>básica</a:t>
+            </a:r>
+          </a:p>
+        </p:txBody>
+      </p:sp>
+      <p:sp>
+        <p:nvSpPr>
+          <p:cNvPr id="7" name="CuadroTexto 6">
+            <a:extLst>
+              <a:ext uri="{FF2B5EF4-FFF2-40B4-BE49-F238E27FC236}">
+                <a16:creationId xmlns:a16="http://schemas.microsoft.com/office/drawing/2014/main" id="{39DC5480-32B0-42D0-BDBE-AB752671937A}"/>
+              </a:ext>
+            </a:extLst>
+          </p:cNvPr>
+          <p:cNvSpPr txBox="1"/>
+          <p:nvPr/>
+        </p:nvSpPr>
+        <p:spPr>
+          <a:xfrm>
+            <a:off x="7609405" y="5948913"/>
+            <a:ext cx="2181252" cy="646331"/>
+          </a:xfrm>
+          <a:prstGeom prst="rect">
+            <a:avLst/>
+          </a:prstGeom>
+          <a:noFill/>
+        </p:spPr>
+        <p:txBody>
+          <a:bodyPr wrap="square" rtlCol="0">
+            <a:spAutoFit/>
+          </a:bodyPr>
+          <a:lstStyle/>
+          <a:p>
+            <a:pPr algn="ctr"/>
+            <a:r>
+              <a:rPr lang="es-ES" b="1" dirty="0">
+                <a:solidFill>
+                  <a:schemeClr val="accent1">
+                    <a:lumMod val="50000"/>
+                  </a:schemeClr>
+                </a:solidFill>
+                <a:latin typeface="Arial" panose="020B0604020202020204" pitchFamily="34" charset="0"/>
+                <a:cs typeface="Arial" panose="020B0604020202020204" pitchFamily="34" charset="0"/>
+              </a:rPr>
+              <a:t>Mejora de diseño y </a:t>
+            </a:r>
+            <a:r>
+              <a:rPr lang="es-ES" b="1" dirty="0" err="1">
+                <a:solidFill>
+                  <a:schemeClr val="accent1">
+                    <a:lumMod val="50000"/>
+                  </a:schemeClr>
+                </a:solidFill>
+                <a:latin typeface="Arial" panose="020B0604020202020204" pitchFamily="34" charset="0"/>
+                <a:cs typeface="Arial" panose="020B0604020202020204" pitchFamily="34" charset="0"/>
+              </a:rPr>
+              <a:t>layout</a:t>
+            </a:r>
+            <a:endParaRPr lang="es-ES" b="1" dirty="0">
+              <a:solidFill>
+                <a:schemeClr val="accent1">
+                  <a:lumMod val="50000"/>
+                </a:schemeClr>
+              </a:solidFill>
+              <a:latin typeface="Arial" panose="020B0604020202020204" pitchFamily="34" charset="0"/>
+              <a:cs typeface="Arial" panose="020B0604020202020204" pitchFamily="34" charset="0"/>
+            </a:endParaRPr>
+          </a:p>
+        </p:txBody>
+      </p:sp>
+      <p:sp>
+        <p:nvSpPr>
+          <p:cNvPr id="9" name="Flecha: a la derecha 8">
+            <a:extLst>
+              <a:ext uri="{FF2B5EF4-FFF2-40B4-BE49-F238E27FC236}">
+                <a16:creationId xmlns:a16="http://schemas.microsoft.com/office/drawing/2014/main" id="{D4090865-75BE-4693-950C-84986CD5A569}"/>
+              </a:ext>
+            </a:extLst>
+          </p:cNvPr>
+          <p:cNvSpPr/>
+          <p:nvPr/>
+        </p:nvSpPr>
+        <p:spPr>
+          <a:xfrm>
+            <a:off x="5738191" y="3775065"/>
+            <a:ext cx="715618" cy="344557"/>
+          </a:xfrm>
+          <a:prstGeom prst="rightArrow">
+            <a:avLst/>
+          </a:prstGeom>
+          <a:solidFill>
+            <a:schemeClr val="accent1">
+              <a:lumMod val="50000"/>
+            </a:schemeClr>
+          </a:solidFill>
+          <a:ln>
+            <a:solidFill>
+              <a:schemeClr val="accent1">
+                <a:lumMod val="50000"/>
+              </a:schemeClr>
+            </a:solidFill>
+          </a:ln>
+        </p:spPr>
+        <p:style>
+          <a:lnRef idx="2">
+            <a:schemeClr val="accent1">
+              <a:shade val="50000"/>
+            </a:schemeClr>
+          </a:lnRef>
+          <a:fillRef idx="1">
+            <a:schemeClr val="accent1"/>
+          </a:fillRef>
+          <a:effectRef idx="0">
+            <a:schemeClr val="accent1"/>
+          </a:effectRef>
+          <a:fontRef idx="minor">
+            <a:schemeClr val="lt1"/>
+          </a:fontRef>
+        </p:style>
+        <p:txBody>
+          <a:bodyPr rtlCol="0" anchor="ctr"/>
+          <a:lstStyle/>
+          <a:p>
+            <a:pPr algn="ctr"/>
             <a:endParaRPr lang="es-ES"/>
           </a:p>
         </p:txBody>
@@ -7649,7 +8556,7 @@
     </p:spTree>
     <p:extLst>
       <p:ext uri="{BB962C8B-B14F-4D97-AF65-F5344CB8AC3E}">
-        <p14:creationId xmlns:p14="http://schemas.microsoft.com/office/powerpoint/2010/main" val="3377122477"/>
+        <p14:creationId xmlns:p14="http://schemas.microsoft.com/office/powerpoint/2010/main" val="1617212323"/>
       </p:ext>
     </p:extLst>
   </p:cSld>
@@ -7668,6 +8575,212 @@
       </p:transition>
     </mc:Fallback>
   </mc:AlternateContent>
+  <p:timing>
+    <p:tnLst>
+      <p:par>
+        <p:cTn id="1" dur="indefinite" restart="never" nodeType="tmRoot">
+          <p:childTnLst>
+            <p:seq concurrent="1" nextAc="seek">
+              <p:cTn id="2" dur="indefinite" nodeType="mainSeq">
+                <p:childTnLst>
+                  <p:par>
+                    <p:cTn id="3" fill="hold">
+                      <p:stCondLst>
+                        <p:cond delay="indefinite"/>
+                      </p:stCondLst>
+                      <p:childTnLst>
+                        <p:par>
+                          <p:cTn id="4" fill="hold">
+                            <p:stCondLst>
+                              <p:cond delay="0"/>
+                            </p:stCondLst>
+                            <p:childTnLst>
+                              <p:par>
+                                <p:cTn id="5" presetID="1" presetClass="entr" presetSubtype="0" fill="hold" nodeType="clickEffect">
+                                  <p:stCondLst>
+                                    <p:cond delay="0"/>
+                                  </p:stCondLst>
+                                  <p:childTnLst>
+                                    <p:set>
+                                      <p:cBhvr>
+                                        <p:cTn id="6" dur="1" fill="hold">
+                                          <p:stCondLst>
+                                            <p:cond delay="0"/>
+                                          </p:stCondLst>
+                                        </p:cTn>
+                                        <p:tgtEl>
+                                          <p:spTgt spid="8"/>
+                                        </p:tgtEl>
+                                        <p:attrNameLst>
+                                          <p:attrName>style.visibility</p:attrName>
+                                        </p:attrNameLst>
+                                      </p:cBhvr>
+                                      <p:to>
+                                        <p:strVal val="visible"/>
+                                      </p:to>
+                                    </p:set>
+                                  </p:childTnLst>
+                                </p:cTn>
+                              </p:par>
+                              <p:par>
+                                <p:cTn id="7" presetID="1" presetClass="entr" presetSubtype="0" fill="hold" grpId="0" nodeType="withEffect">
+                                  <p:stCondLst>
+                                    <p:cond delay="0"/>
+                                  </p:stCondLst>
+                                  <p:childTnLst>
+                                    <p:set>
+                                      <p:cBhvr>
+                                        <p:cTn id="8" dur="1" fill="hold">
+                                          <p:stCondLst>
+                                            <p:cond delay="0"/>
+                                          </p:stCondLst>
+                                        </p:cTn>
+                                        <p:tgtEl>
+                                          <p:spTgt spid="6"/>
+                                        </p:tgtEl>
+                                        <p:attrNameLst>
+                                          <p:attrName>style.visibility</p:attrName>
+                                        </p:attrNameLst>
+                                      </p:cBhvr>
+                                      <p:to>
+                                        <p:strVal val="visible"/>
+                                      </p:to>
+                                    </p:set>
+                                  </p:childTnLst>
+                                </p:cTn>
+                              </p:par>
+                            </p:childTnLst>
+                          </p:cTn>
+                        </p:par>
+                      </p:childTnLst>
+                    </p:cTn>
+                  </p:par>
+                  <p:par>
+                    <p:cTn id="9" fill="hold">
+                      <p:stCondLst>
+                        <p:cond delay="indefinite"/>
+                      </p:stCondLst>
+                      <p:childTnLst>
+                        <p:par>
+                          <p:cTn id="10" fill="hold">
+                            <p:stCondLst>
+                              <p:cond delay="0"/>
+                            </p:stCondLst>
+                            <p:childTnLst>
+                              <p:par>
+                                <p:cTn id="11" presetID="1" presetClass="entr" presetSubtype="0" fill="hold" grpId="0" nodeType="clickEffect">
+                                  <p:stCondLst>
+                                    <p:cond delay="0"/>
+                                  </p:stCondLst>
+                                  <p:childTnLst>
+                                    <p:set>
+                                      <p:cBhvr>
+                                        <p:cTn id="12" dur="1" fill="hold">
+                                          <p:stCondLst>
+                                            <p:cond delay="0"/>
+                                          </p:stCondLst>
+                                        </p:cTn>
+                                        <p:tgtEl>
+                                          <p:spTgt spid="9"/>
+                                        </p:tgtEl>
+                                        <p:attrNameLst>
+                                          <p:attrName>style.visibility</p:attrName>
+                                        </p:attrNameLst>
+                                      </p:cBhvr>
+                                      <p:to>
+                                        <p:strVal val="visible"/>
+                                      </p:to>
+                                    </p:set>
+                                  </p:childTnLst>
+                                </p:cTn>
+                              </p:par>
+                              <p:par>
+                                <p:cTn id="13" presetID="1" presetClass="entr" presetSubtype="0" fill="hold" grpId="0" nodeType="withEffect">
+                                  <p:stCondLst>
+                                    <p:cond delay="0"/>
+                                  </p:stCondLst>
+                                  <p:childTnLst>
+                                    <p:set>
+                                      <p:cBhvr>
+                                        <p:cTn id="14" dur="1" fill="hold">
+                                          <p:stCondLst>
+                                            <p:cond delay="0"/>
+                                          </p:stCondLst>
+                                        </p:cTn>
+                                        <p:tgtEl>
+                                          <p:spTgt spid="7"/>
+                                        </p:tgtEl>
+                                        <p:attrNameLst>
+                                          <p:attrName>style.visibility</p:attrName>
+                                        </p:attrNameLst>
+                                      </p:cBhvr>
+                                      <p:to>
+                                        <p:strVal val="visible"/>
+                                      </p:to>
+                                    </p:set>
+                                  </p:childTnLst>
+                                </p:cTn>
+                              </p:par>
+                              <p:par>
+                                <p:cTn id="15" presetID="1" presetClass="entr" presetSubtype="0" fill="hold" nodeType="withEffect">
+                                  <p:stCondLst>
+                                    <p:cond delay="0"/>
+                                  </p:stCondLst>
+                                  <p:childTnLst>
+                                    <p:set>
+                                      <p:cBhvr>
+                                        <p:cTn id="16" dur="1" fill="hold">
+                                          <p:stCondLst>
+                                            <p:cond delay="0"/>
+                                          </p:stCondLst>
+                                        </p:cTn>
+                                        <p:tgtEl>
+                                          <p:spTgt spid="5"/>
+                                        </p:tgtEl>
+                                        <p:attrNameLst>
+                                          <p:attrName>style.visibility</p:attrName>
+                                        </p:attrNameLst>
+                                      </p:cBhvr>
+                                      <p:to>
+                                        <p:strVal val="visible"/>
+                                      </p:to>
+                                    </p:set>
+                                  </p:childTnLst>
+                                </p:cTn>
+                              </p:par>
+                            </p:childTnLst>
+                          </p:cTn>
+                        </p:par>
+                      </p:childTnLst>
+                    </p:cTn>
+                  </p:par>
+                </p:childTnLst>
+              </p:cTn>
+              <p:prevCondLst>
+                <p:cond evt="onPrev" delay="0">
+                  <p:tgtEl>
+                    <p:sldTgt/>
+                  </p:tgtEl>
+                </p:cond>
+              </p:prevCondLst>
+              <p:nextCondLst>
+                <p:cond evt="onNext" delay="0">
+                  <p:tgtEl>
+                    <p:sldTgt/>
+                  </p:tgtEl>
+                </p:cond>
+              </p:nextCondLst>
+            </p:seq>
+          </p:childTnLst>
+        </p:cTn>
+      </p:par>
+    </p:tnLst>
+    <p:bldLst>
+      <p:bldP spid="6" grpId="0"/>
+      <p:bldP spid="7" grpId="0"/>
+      <p:bldP spid="9" grpId="0" animBg="1"/>
+    </p:bldLst>
+  </p:timing>
 </p:sld>
 </file>
 
@@ -7769,7 +8882,7 @@
           <a:p>
             <a:pPr algn="r"/>
             <a:r>
-              <a:rPr lang="es-ES" dirty="0" smtClean="0">
+              <a:rPr lang="es-ES" dirty="0">
                 <a:latin typeface="Calibri" panose="020F0502020204030204" pitchFamily="34" charset="0"/>
                 <a:cs typeface="Calibri" panose="020F0502020204030204" pitchFamily="34" charset="0"/>
               </a:rPr>
@@ -7805,7 +8918,7 @@
           <a:lstStyle/>
           <a:p>
             <a:r>
-              <a:rPr lang="es-ES" dirty="0" smtClean="0">
+              <a:rPr lang="es-ES" dirty="0">
                 <a:latin typeface="Calibri" panose="020F0502020204030204" pitchFamily="34" charset="0"/>
                 <a:cs typeface="Calibri" panose="020F0502020204030204" pitchFamily="34" charset="0"/>
               </a:rPr>
@@ -7838,7 +8951,7 @@
           <a:p>
             <a:pPr algn="r"/>
             <a:r>
-              <a:rPr lang="es-ES" dirty="0" smtClean="0">
+              <a:rPr lang="es-ES" dirty="0">
                 <a:latin typeface="Calibri" panose="020F0502020204030204" pitchFamily="34" charset="0"/>
                 <a:cs typeface="Calibri" panose="020F0502020204030204" pitchFamily="34" charset="0"/>
               </a:rPr>
@@ -8107,7 +9220,7 @@
           <a:lstStyle/>
           <a:p>
             <a:r>
-              <a:rPr lang="es-ES" dirty="0" smtClean="0"/>
+              <a:rPr lang="es-ES" dirty="0"/>
               <a:t>La imagen entera actúa como un botón y cambia el fondo entre el encendido y el apagado.</a:t>
             </a:r>
           </a:p>
@@ -8136,15 +9249,15 @@
           <a:lstStyle/>
           <a:p>
             <a:r>
-              <a:rPr lang="es-ES" dirty="0" smtClean="0"/>
+              <a:rPr lang="es-ES" dirty="0"/>
               <a:t>El sonido interactúa con el </a:t>
             </a:r>
             <a:r>
-              <a:rPr lang="es-ES" dirty="0" err="1" smtClean="0"/>
+              <a:rPr lang="es-ES" dirty="0" err="1"/>
               <a:t>acelerómeto</a:t>
             </a:r>
             <a:r>
-              <a:rPr lang="es-ES" dirty="0" smtClean="0"/>
+              <a:rPr lang="es-ES" dirty="0"/>
               <a:t> del dispositivo.</a:t>
             </a:r>
             <a:endParaRPr lang="en-GB" dirty="0"/>

</xml_diff>